<commit_message>
Groundsat, ARAP, User Terminals
Slide added to talk about the different parts of the development system
</commit_message>
<xml_diff>
--- a/Papers_and_Presentations/PARC_4on4.pptx
+++ b/Papers_and_Presentations/PARC_4on4.pptx
@@ -5,27 +5,30 @@
     <p:sldMasterId id="2147483648" r:id="rId1"/>
   </p:sldMasterIdLst>
   <p:notesMasterIdLst>
-    <p:notesMasterId r:id="rId20"/>
+    <p:notesMasterId r:id="rId23"/>
   </p:notesMasterIdLst>
   <p:sldIdLst>
     <p:sldId id="259" r:id="rId2"/>
     <p:sldId id="261" r:id="rId3"/>
     <p:sldId id="266" r:id="rId4"/>
-    <p:sldId id="273" r:id="rId5"/>
-    <p:sldId id="272" r:id="rId6"/>
-    <p:sldId id="262" r:id="rId7"/>
-    <p:sldId id="263" r:id="rId8"/>
-    <p:sldId id="276" r:id="rId9"/>
-    <p:sldId id="275" r:id="rId10"/>
-    <p:sldId id="278" r:id="rId11"/>
-    <p:sldId id="277" r:id="rId12"/>
-    <p:sldId id="264" r:id="rId13"/>
-    <p:sldId id="274" r:id="rId14"/>
-    <p:sldId id="271" r:id="rId15"/>
-    <p:sldId id="267" r:id="rId16"/>
-    <p:sldId id="268" r:id="rId17"/>
-    <p:sldId id="269" r:id="rId18"/>
-    <p:sldId id="270" r:id="rId19"/>
+    <p:sldId id="279" r:id="rId5"/>
+    <p:sldId id="273" r:id="rId6"/>
+    <p:sldId id="272" r:id="rId7"/>
+    <p:sldId id="262" r:id="rId8"/>
+    <p:sldId id="263" r:id="rId9"/>
+    <p:sldId id="276" r:id="rId10"/>
+    <p:sldId id="275" r:id="rId11"/>
+    <p:sldId id="278" r:id="rId12"/>
+    <p:sldId id="277" r:id="rId13"/>
+    <p:sldId id="280" r:id="rId14"/>
+    <p:sldId id="281" r:id="rId15"/>
+    <p:sldId id="274" r:id="rId16"/>
+    <p:sldId id="264" r:id="rId17"/>
+    <p:sldId id="271" r:id="rId18"/>
+    <p:sldId id="267" r:id="rId19"/>
+    <p:sldId id="268" r:id="rId20"/>
+    <p:sldId id="269" r:id="rId21"/>
+    <p:sldId id="270" r:id="rId22"/>
   </p:sldIdLst>
   <p:sldSz cx="9144000" cy="6858000" type="screen4x3"/>
   <p:notesSz cx="6858000" cy="9144000"/>
@@ -136,6 +139,7 @@
           <p14:sldIdLst>
             <p14:sldId id="261"/>
             <p14:sldId id="266"/>
+            <p14:sldId id="279"/>
             <p14:sldId id="273"/>
             <p14:sldId id="272"/>
           </p14:sldIdLst>
@@ -148,12 +152,14 @@
             <p14:sldId id="275"/>
             <p14:sldId id="278"/>
             <p14:sldId id="277"/>
+            <p14:sldId id="280"/>
+            <p14:sldId id="281"/>
           </p14:sldIdLst>
         </p14:section>
         <p14:section name="Timeline" id="{CF24EBA6-C924-424D-AC31-A4B9992A87E0}">
           <p14:sldIdLst>
+            <p14:sldId id="274"/>
             <p14:sldId id="264"/>
-            <p14:sldId id="274"/>
             <p14:sldId id="271"/>
           </p14:sldIdLst>
         </p14:section>
@@ -6089,13 +6095,25 @@
         <a:lstStyle/>
         <a:p>
           <a:r>
-            <a:rPr lang="en-US" sz="2400" dirty="0" smtClean="0">
+            <a:rPr lang="en-US" sz="2800" dirty="0" smtClean="0">
+              <a:solidFill>
+                <a:schemeClr val="accent4">
+                  <a:lumMod val="60000"/>
+                  <a:lumOff val="40000"/>
+                </a:schemeClr>
+              </a:solidFill>
               <a:latin typeface="Times New Roman" pitchFamily="18" charset="0"/>
               <a:cs typeface="Times New Roman" pitchFamily="18" charset="0"/>
             </a:rPr>
             <a:t>Ascent Project</a:t>
           </a:r>
-          <a:endParaRPr lang="en-US" sz="2400" dirty="0">
+          <a:endParaRPr lang="en-US" sz="2800" dirty="0">
+            <a:solidFill>
+              <a:schemeClr val="accent4">
+                <a:lumMod val="60000"/>
+                <a:lumOff val="40000"/>
+              </a:schemeClr>
+            </a:solidFill>
             <a:latin typeface="Times New Roman" pitchFamily="18" charset="0"/>
             <a:cs typeface="Times New Roman" pitchFamily="18" charset="0"/>
           </a:endParaRPr>
@@ -6124,7 +6142,7 @@
         </a:p>
       </dgm:t>
     </dgm:pt>
-    <dgm:pt modelId="{1EA91D19-03FC-2A45-9979-9A694B05AD29}">
+    <dgm:pt modelId="{8D4D3D90-8B60-F145-B608-07831CC57A8B}">
       <dgm:prSet custT="1"/>
       <dgm:spPr/>
       <dgm:t>
@@ -6133,19 +6151,31 @@
         <a:p>
           <a:r>
             <a:rPr lang="en-US" sz="2800" dirty="0" smtClean="0">
+              <a:solidFill>
+                <a:schemeClr val="tx2">
+                  <a:lumMod val="60000"/>
+                  <a:lumOff val="40000"/>
+                </a:schemeClr>
+              </a:solidFill>
               <a:latin typeface="Times New Roman" pitchFamily="18" charset="0"/>
               <a:cs typeface="Times New Roman" pitchFamily="18" charset="0"/>
             </a:rPr>
-            <a:t>Phase 4 project</a:t>
+            <a:t>Phase 4 Project</a:t>
           </a:r>
           <a:endParaRPr lang="en-US" sz="2800" dirty="0">
+            <a:solidFill>
+              <a:schemeClr val="tx2">
+                <a:lumMod val="60000"/>
+                <a:lumOff val="40000"/>
+              </a:schemeClr>
+            </a:solidFill>
             <a:latin typeface="Times New Roman" pitchFamily="18" charset="0"/>
             <a:cs typeface="Times New Roman" pitchFamily="18" charset="0"/>
           </a:endParaRPr>
         </a:p>
       </dgm:t>
     </dgm:pt>
-    <dgm:pt modelId="{96E23097-4BEE-534F-93F1-BA949C1C90BD}" type="parTrans" cxnId="{A5ECC648-4DBC-0245-8945-5139346DC3A3}">
+    <dgm:pt modelId="{EC2D21C7-C1C9-F94E-9822-FDD5BDFB328D}" type="parTrans" cxnId="{65A1F43E-1E7E-7E4E-9376-C1B9D69C48BA}">
       <dgm:prSet/>
       <dgm:spPr/>
       <dgm:t>
@@ -6156,7 +6186,7 @@
         </a:p>
       </dgm:t>
     </dgm:pt>
-    <dgm:pt modelId="{1CC5F9B2-E476-0944-A92E-D2444F6BDD34}" type="sibTrans" cxnId="{A5ECC648-4DBC-0245-8945-5139346DC3A3}">
+    <dgm:pt modelId="{65B538EE-D318-F54E-B0BF-ACEA40D45DA3}" type="sibTrans" cxnId="{65A1F43E-1E7E-7E4E-9376-C1B9D69C48BA}">
       <dgm:prSet/>
       <dgm:spPr/>
       <dgm:t>
@@ -6395,9 +6425,7 @@
     <dgm:cxn modelId="{33E3C84B-3A35-5A4A-A681-DB45293F8053}" type="presOf" srcId="{25761703-EE26-4CA8-B049-3F157889CE06}" destId="{BAE03DB3-7386-3347-A6E7-4D1856DEB6AE}" srcOrd="0" destOrd="0" presId="urn:microsoft.com/office/officeart/2005/8/layout/chevron1"/>
     <dgm:cxn modelId="{E86B9BB8-3EB1-AC4B-B8CA-F843C5E2090A}" type="presOf" srcId="{EB0B1996-313B-E245-957B-63F73EAAD945}" destId="{404E8A43-A873-FA44-998C-A9E05BBA922D}" srcOrd="0" destOrd="0" presId="urn:microsoft.com/office/officeart/2005/8/layout/chevron1"/>
     <dgm:cxn modelId="{4F7CA4AE-94FE-4378-A583-281ED01F3A26}" srcId="{8BBD982B-F274-4BA3-8F19-028AA15117A4}" destId="{E731978B-F94B-47D7-AFDE-5668EE8523C9}" srcOrd="3" destOrd="0" parTransId="{347D0D83-196D-4ACE-95D8-CD164212347B}" sibTransId="{EE1B103E-6B40-4F05-8FE6-0D6F6D6931A3}"/>
-    <dgm:cxn modelId="{5A2CB882-22C4-064C-A8DB-628FACB51AC3}" type="presOf" srcId="{1EA91D19-03FC-2A45-9979-9A694B05AD29}" destId="{A75EA79E-4DF9-5243-BA14-FE342E07D156}" srcOrd="0" destOrd="1" presId="urn:microsoft.com/office/officeart/2005/8/layout/chevron1"/>
     <dgm:cxn modelId="{7D87FF64-1C3C-ED4A-AB26-34B4E322CAFB}" type="presOf" srcId="{EEA32B6A-E304-6541-9946-E419B3071B71}" destId="{4B1D116A-97D8-4F49-A3B4-CAF3F59798DF}" srcOrd="0" destOrd="0" presId="urn:microsoft.com/office/officeart/2005/8/layout/chevron1"/>
-    <dgm:cxn modelId="{A5ECC648-4DBC-0245-8945-5139346DC3A3}" srcId="{E731978B-F94B-47D7-AFDE-5668EE8523C9}" destId="{1EA91D19-03FC-2A45-9979-9A694B05AD29}" srcOrd="1" destOrd="0" parTransId="{96E23097-4BEE-534F-93F1-BA949C1C90BD}" sibTransId="{1CC5F9B2-E476-0944-A92E-D2444F6BDD34}"/>
     <dgm:cxn modelId="{23973E9B-BFE6-9E49-83A4-ADE8A383C139}" srcId="{25761703-EE26-4CA8-B049-3F157889CE06}" destId="{0344D70B-B8C9-4341-AB4A-ED3BF97CA174}" srcOrd="0" destOrd="0" parTransId="{25AEAA4D-581C-4E4F-88CC-539842CF40DC}" sibTransId="{6B56D53F-2770-0F40-A549-BB05F4DAAAA8}"/>
     <dgm:cxn modelId="{98A20B4B-3CB8-174A-BDBC-6601031F9964}" type="presOf" srcId="{964A18CD-1B5D-4A7E-B182-2927E17348E0}" destId="{BD8A285E-F330-DB40-97B1-444986EAA641}" srcOrd="0" destOrd="0" presId="urn:microsoft.com/office/officeart/2005/8/layout/chevron1"/>
     <dgm:cxn modelId="{07C9254F-D137-F440-B27D-3AD2F09510AF}" srcId="{8BBD982B-F274-4BA3-8F19-028AA15117A4}" destId="{EB0B1996-313B-E245-957B-63F73EAAD945}" srcOrd="4" destOrd="0" parTransId="{EEA385DA-7059-604E-AA9E-E85F0B7073C2}" sibTransId="{9785E02A-5068-B24E-9879-B07F98F9D61C}"/>
@@ -6406,7 +6434,9 @@
     <dgm:cxn modelId="{7B55D8CE-509A-ED40-85A4-7A41BE4BECF4}" type="presOf" srcId="{E731978B-F94B-47D7-AFDE-5668EE8523C9}" destId="{3DDA6EAD-62B8-4949-B65D-01B61B43B5A9}" srcOrd="0" destOrd="0" presId="urn:microsoft.com/office/officeart/2005/8/layout/chevron1"/>
     <dgm:cxn modelId="{E41A4CAE-7EB0-0943-9810-64A55853614B}" srcId="{E731978B-F94B-47D7-AFDE-5668EE8523C9}" destId="{9E06344B-7C74-CA4E-9D70-E57CAE7FDA0F}" srcOrd="0" destOrd="0" parTransId="{19F8C3E9-B0D7-484A-964B-6EE8BECAFFD8}" sibTransId="{CB7E358A-22C2-C547-B9C4-4FF227DE5C63}"/>
     <dgm:cxn modelId="{22532DA8-4E94-3B4C-BD05-FA4254D0E789}" type="presOf" srcId="{9E06344B-7C74-CA4E-9D70-E57CAE7FDA0F}" destId="{A75EA79E-4DF9-5243-BA14-FE342E07D156}" srcOrd="0" destOrd="0" presId="urn:microsoft.com/office/officeart/2005/8/layout/chevron1"/>
+    <dgm:cxn modelId="{65A1F43E-1E7E-7E4E-9376-C1B9D69C48BA}" srcId="{E731978B-F94B-47D7-AFDE-5668EE8523C9}" destId="{8D4D3D90-8B60-F145-B608-07831CC57A8B}" srcOrd="1" destOrd="0" parTransId="{EC2D21C7-C1C9-F94E-9822-FDD5BDFB328D}" sibTransId="{65B538EE-D318-F54E-B0BF-ACEA40D45DA3}"/>
     <dgm:cxn modelId="{9B28A389-D33A-3943-8F97-011F6100C3B5}" type="presOf" srcId="{C97D71F7-B8E1-5444-B82C-B22EDA2AC9AF}" destId="{1ED0CC34-36C9-E54B-8649-0FFD94E5CFBC}" srcOrd="0" destOrd="0" presId="urn:microsoft.com/office/officeart/2005/8/layout/chevron1"/>
+    <dgm:cxn modelId="{9E310AC5-EACF-6840-BDDC-7A463875A3FA}" type="presOf" srcId="{8D4D3D90-8B60-F145-B608-07831CC57A8B}" destId="{A75EA79E-4DF9-5243-BA14-FE342E07D156}" srcOrd="0" destOrd="1" presId="urn:microsoft.com/office/officeart/2005/8/layout/chevron1"/>
     <dgm:cxn modelId="{A352F276-E7A9-7547-AEE6-40518E112F63}" type="presParOf" srcId="{83BF0D0E-CEE2-4D71-A59A-24428141268C}" destId="{42A142AF-8048-9644-8E08-399117118059}" srcOrd="0" destOrd="0" presId="urn:microsoft.com/office/officeart/2005/8/layout/chevron1"/>
     <dgm:cxn modelId="{C6584154-4F3C-5143-A8FB-26A20AD86EA4}" type="presParOf" srcId="{42A142AF-8048-9644-8E08-399117118059}" destId="{29D95D29-84C6-9046-A032-F993368F41A3}" srcOrd="0" destOrd="0" presId="urn:microsoft.com/office/officeart/2005/8/layout/chevron1"/>
     <dgm:cxn modelId="{FEC2A2A1-15C6-814A-A02B-8D2A87A1D2DF}" type="presParOf" srcId="{42A142AF-8048-9644-8E08-399117118059}" destId="{B28826FA-0133-F04F-A724-48ADB5D79868}" srcOrd="1" destOrd="0" presId="urn:microsoft.com/office/officeart/2005/8/layout/chevron1"/>
@@ -10610,12 +10640,24 @@
           </a:pPr>
           <a:r>
             <a:rPr lang="en-US" sz="2800" kern="1200" dirty="0" smtClean="0">
+              <a:solidFill>
+                <a:schemeClr val="tx2">
+                  <a:lumMod val="60000"/>
+                  <a:lumOff val="40000"/>
+                </a:schemeClr>
+              </a:solidFill>
               <a:latin typeface="Times New Roman" pitchFamily="18" charset="0"/>
               <a:cs typeface="Times New Roman" pitchFamily="18" charset="0"/>
             </a:rPr>
-            <a:t>Phase 4 project</a:t>
+            <a:t>Phase 4 Project</a:t>
           </a:r>
           <a:endParaRPr lang="en-US" sz="2800" kern="1200" dirty="0">
+            <a:solidFill>
+              <a:schemeClr val="tx2">
+                <a:lumMod val="60000"/>
+                <a:lumOff val="40000"/>
+              </a:schemeClr>
+            </a:solidFill>
             <a:latin typeface="Times New Roman" pitchFamily="18" charset="0"/>
             <a:cs typeface="Times New Roman" pitchFamily="18" charset="0"/>
           </a:endParaRPr>
@@ -10805,7 +10847,7 @@
           </a:endParaRPr>
         </a:p>
         <a:p>
-          <a:pPr marL="228600" lvl="1" indent="-228600" algn="l" defTabSz="1066800">
+          <a:pPr marL="285750" lvl="1" indent="-285750" algn="l" defTabSz="1244600">
             <a:lnSpc>
               <a:spcPct val="90000"/>
             </a:lnSpc>
@@ -10818,13 +10860,25 @@
             <a:buChar char="••"/>
           </a:pPr>
           <a:r>
-            <a:rPr lang="en-US" sz="2400" kern="1200" dirty="0" smtClean="0">
+            <a:rPr lang="en-US" sz="2800" kern="1200" dirty="0" smtClean="0">
+              <a:solidFill>
+                <a:schemeClr val="accent4">
+                  <a:lumMod val="60000"/>
+                  <a:lumOff val="40000"/>
+                </a:schemeClr>
+              </a:solidFill>
               <a:latin typeface="Times New Roman" pitchFamily="18" charset="0"/>
               <a:cs typeface="Times New Roman" pitchFamily="18" charset="0"/>
             </a:rPr>
             <a:t>Ascent Project</a:t>
           </a:r>
-          <a:endParaRPr lang="en-US" sz="2400" kern="1200" dirty="0">
+          <a:endParaRPr lang="en-US" sz="2800" kern="1200" dirty="0">
+            <a:solidFill>
+              <a:schemeClr val="accent4">
+                <a:lumMod val="60000"/>
+                <a:lumOff val="40000"/>
+              </a:schemeClr>
+            </a:solidFill>
             <a:latin typeface="Times New Roman" pitchFamily="18" charset="0"/>
             <a:cs typeface="Times New Roman" pitchFamily="18" charset="0"/>
           </a:endParaRPr>
@@ -31131,7 +31185,7 @@
             <a:fld id="{5E0C3846-8D4C-4326-8BC7-9B455A036298}" type="slidenum">
               <a:rPr lang="en-US" smtClean="0"/>
               <a:pPr/>
-              <a:t>16</a:t>
+              <a:t>19</a:t>
             </a:fld>
             <a:endParaRPr lang="en-US"/>
           </a:p>
@@ -31239,7 +31293,7 @@
             <a:fld id="{5E0C3846-8D4C-4326-8BC7-9B455A036298}" type="slidenum">
               <a:rPr lang="en-US" smtClean="0"/>
               <a:pPr/>
-              <a:t>17</a:t>
+              <a:t>20</a:t>
             </a:fld>
             <a:endParaRPr lang="en-US"/>
           </a:p>
@@ -31321,7 +31375,7 @@
             <a:fld id="{5E0C3846-8D4C-4326-8BC7-9B455A036298}" type="slidenum">
               <a:rPr lang="en-US" smtClean="0"/>
               <a:pPr/>
-              <a:t>18</a:t>
+              <a:t>21</a:t>
             </a:fld>
             <a:endParaRPr lang="en-US"/>
           </a:p>
@@ -31606,7 +31660,7 @@
             <a:fld id="{5E0C3846-8D4C-4326-8BC7-9B455A036298}" type="slidenum">
               <a:rPr lang="en-US" smtClean="0"/>
               <a:pPr/>
-              <a:t>4</a:t>
+              <a:t>5</a:t>
             </a:fld>
             <a:endParaRPr lang="en-US"/>
           </a:p>
@@ -31719,7 +31773,7 @@
             <a:fld id="{5E0C3846-8D4C-4326-8BC7-9B455A036298}" type="slidenum">
               <a:rPr lang="en-US" smtClean="0"/>
               <a:pPr/>
-              <a:t>6</a:t>
+              <a:t>7</a:t>
             </a:fld>
             <a:endParaRPr lang="en-US"/>
           </a:p>
@@ -31820,18 +31874,7 @@
                 <a:ea typeface="+mn-ea"/>
                 <a:cs typeface="+mn-cs"/>
               </a:rPr>
-              <a:t> are a controlled </a:t>
-            </a:r>
-            <a:r>
-              <a:rPr lang="en-US" sz="1200" kern="1200" baseline="0" smtClean="0">
-                <a:solidFill>
-                  <a:schemeClr val="tx1"/>
-                </a:solidFill>
-                <a:latin typeface="+mn-lt"/>
-                <a:ea typeface="+mn-ea"/>
-                <a:cs typeface="+mn-cs"/>
-              </a:rPr>
-              <a:t>technology.</a:t>
+              <a:t> are a controlled technology. </a:t>
             </a:r>
             <a:endParaRPr lang="en-US" dirty="0"/>
           </a:p>
@@ -31855,7 +31898,7 @@
             <a:fld id="{5E0C3846-8D4C-4326-8BC7-9B455A036298}" type="slidenum">
               <a:rPr lang="en-US" smtClean="0"/>
               <a:pPr/>
-              <a:t>7</a:t>
+              <a:t>8</a:t>
             </a:fld>
             <a:endParaRPr lang="en-US"/>
           </a:p>
@@ -31948,7 +31991,7 @@
           <a:p>
             <a:fld id="{F8646707-6BBD-41A9-B4DF-0C76A73A2D2A}" type="slidenum">
               <a:rPr lang="en-US" smtClean="0"/>
-              <a:t>8</a:t>
+              <a:t>9</a:t>
             </a:fld>
             <a:endParaRPr lang="en-US"/>
           </a:p>
@@ -32032,7 +32075,7 @@
           <a:p>
             <a:fld id="{F8646707-6BBD-41A9-B4DF-0C76A73A2D2A}" type="slidenum">
               <a:rPr lang="en-US" smtClean="0"/>
-              <a:t>9</a:t>
+              <a:t>10</a:t>
             </a:fld>
             <a:endParaRPr lang="en-US"/>
           </a:p>
@@ -32147,7 +32190,7 @@
             <a:fld id="{5E0C3846-8D4C-4326-8BC7-9B455A036298}" type="slidenum">
               <a:rPr lang="en-US" smtClean="0"/>
               <a:pPr/>
-              <a:t>12</a:t>
+              <a:t>16</a:t>
             </a:fld>
             <a:endParaRPr lang="en-US"/>
           </a:p>
@@ -36319,6 +36362,99 @@
           <a:chExt cx="0" cy="0"/>
         </a:xfrm>
       </p:grpSpPr>
+      <p:sp>
+        <p:nvSpPr>
+          <p:cNvPr id="11" name="Title 10"/>
+          <p:cNvSpPr>
+            <a:spLocks noGrp="1"/>
+          </p:cNvSpPr>
+          <p:nvPr>
+            <p:ph type="title"/>
+          </p:nvPr>
+        </p:nvSpPr>
+        <p:spPr/>
+        <p:txBody>
+          <a:bodyPr/>
+          <a:lstStyle/>
+          <a:p>
+            <a:r>
+              <a:rPr lang="en-US" dirty="0" smtClean="0"/>
+              <a:t>Phase 4 Ground Team Structure</a:t>
+            </a:r>
+            <a:endParaRPr lang="en-US" dirty="0"/>
+          </a:p>
+        </p:txBody>
+      </p:sp>
+      <p:pic>
+        <p:nvPicPr>
+          <p:cNvPr id="13" name="Picture 12" descr="herd_of_cats.jpg"/>
+          <p:cNvPicPr>
+            <a:picLocks noChangeAspect="1"/>
+          </p:cNvPicPr>
+          <p:nvPr/>
+        </p:nvPicPr>
+        <p:blipFill>
+          <a:blip r:embed="rId3">
+            <a:extLst>
+              <a:ext uri="{28A0092B-C50C-407E-A947-70E740481C1C}">
+                <a14:useLocalDpi xmlns:a14="http://schemas.microsoft.com/office/drawing/2010/main" val="0"/>
+              </a:ext>
+            </a:extLst>
+          </a:blip>
+          <a:stretch>
+            <a:fillRect/>
+          </a:stretch>
+        </p:blipFill>
+        <p:spPr>
+          <a:xfrm>
+            <a:off x="304800" y="1676400"/>
+            <a:ext cx="8496300" cy="4787900"/>
+          </a:xfrm>
+          <a:prstGeom prst="rect">
+            <a:avLst/>
+          </a:prstGeom>
+        </p:spPr>
+      </p:pic>
+    </p:spTree>
+    <p:extLst>
+      <p:ext uri="{BB962C8B-B14F-4D97-AF65-F5344CB8AC3E}">
+        <p14:creationId xmlns:p14="http://schemas.microsoft.com/office/powerpoint/2010/main" val="1936543360"/>
+      </p:ext>
+    </p:extLst>
+  </p:cSld>
+  <p:clrMapOvr>
+    <a:masterClrMapping/>
+  </p:clrMapOvr>
+  <p:transition xmlns:p14="http://schemas.microsoft.com/office/powerpoint/2010/main" spd="slow">
+    <p:fade/>
+  </p:transition>
+  <p:timing>
+    <p:tnLst>
+      <p:par>
+        <p:cTn xmlns:p14="http://schemas.microsoft.com/office/powerpoint/2010/main" id="1" dur="indefinite" restart="never" nodeType="tmRoot"/>
+      </p:par>
+    </p:tnLst>
+  </p:timing>
+</p:sld>
+</file>
+
+<file path=ppt/slides/slide11.xml><?xml version="1.0" encoding="utf-8"?>
+<p:sld xmlns:a="http://schemas.openxmlformats.org/drawingml/2006/main" xmlns:r="http://schemas.openxmlformats.org/officeDocument/2006/relationships" xmlns:p="http://schemas.openxmlformats.org/presentationml/2006/main">
+  <p:cSld>
+    <p:spTree>
+      <p:nvGrpSpPr>
+        <p:cNvPr id="1" name=""/>
+        <p:cNvGrpSpPr/>
+        <p:nvPr/>
+      </p:nvGrpSpPr>
+      <p:grpSpPr>
+        <a:xfrm>
+          <a:off x="0" y="0"/>
+          <a:ext cx="0" cy="0"/>
+          <a:chOff x="0" y="0"/>
+          <a:chExt cx="0" cy="0"/>
+        </a:xfrm>
+      </p:grpSpPr>
       <p:graphicFrame>
         <p:nvGraphicFramePr>
           <p:cNvPr id="4" name="Diagram 3"/>
@@ -36392,7 +36528,7 @@
 </p:sld>
 </file>
 
-<file path=ppt/slides/slide11.xml><?xml version="1.0" encoding="utf-8"?>
+<file path=ppt/slides/slide12.xml><?xml version="1.0" encoding="utf-8"?>
 <p:sld xmlns:a="http://schemas.openxmlformats.org/drawingml/2006/main" xmlns:r="http://schemas.openxmlformats.org/officeDocument/2006/relationships" xmlns:p="http://schemas.openxmlformats.org/presentationml/2006/main">
   <p:cSld>
     <p:spTree>
@@ -36482,7 +36618,206 @@
 </p:sld>
 </file>
 
-<file path=ppt/slides/slide12.xml><?xml version="1.0" encoding="utf-8"?>
+<file path=ppt/slides/slide13.xml><?xml version="1.0" encoding="utf-8"?>
+<p:sld xmlns:a="http://schemas.openxmlformats.org/drawingml/2006/main" xmlns:r="http://schemas.openxmlformats.org/officeDocument/2006/relationships" xmlns:p="http://schemas.openxmlformats.org/presentationml/2006/main">
+  <p:cSld>
+    <p:spTree>
+      <p:nvGrpSpPr>
+        <p:cNvPr id="1" name=""/>
+        <p:cNvGrpSpPr/>
+        <p:nvPr/>
+      </p:nvGrpSpPr>
+      <p:grpSpPr>
+        <a:xfrm>
+          <a:off x="0" y="0"/>
+          <a:ext cx="0" cy="0"/>
+          <a:chOff x="0" y="0"/>
+          <a:chExt cx="0" cy="0"/>
+        </a:xfrm>
+      </p:grpSpPr>
+      <p:sp>
+        <p:nvSpPr>
+          <p:cNvPr id="10" name="Title 9"/>
+          <p:cNvSpPr>
+            <a:spLocks noGrp="1"/>
+          </p:cNvSpPr>
+          <p:nvPr>
+            <p:ph type="title"/>
+          </p:nvPr>
+        </p:nvSpPr>
+        <p:spPr/>
+        <p:txBody>
+          <a:bodyPr/>
+          <a:lstStyle/>
+          <a:p>
+            <a:r>
+              <a:rPr lang="en-US" dirty="0" smtClean="0"/>
+              <a:t>Development System</a:t>
+            </a:r>
+            <a:endParaRPr lang="en-US" dirty="0"/>
+          </a:p>
+        </p:txBody>
+      </p:sp>
+      <p:sp>
+        <p:nvSpPr>
+          <p:cNvPr id="11" name="Subtitle 10"/>
+          <p:cNvSpPr>
+            <a:spLocks noGrp="1"/>
+          </p:cNvSpPr>
+          <p:nvPr>
+            <p:ph idx="1"/>
+          </p:nvPr>
+        </p:nvSpPr>
+        <p:spPr/>
+        <p:txBody>
+          <a:bodyPr/>
+          <a:lstStyle/>
+          <a:p>
+            <a:r>
+              <a:rPr lang="en-US" b="1" dirty="0" err="1" smtClean="0"/>
+              <a:t>Groundsat</a:t>
+            </a:r>
+            <a:r>
+              <a:rPr lang="en-US" dirty="0" smtClean="0"/>
+              <a:t> is a satellite simulator</a:t>
+            </a:r>
+          </a:p>
+          <a:p>
+            <a:r>
+              <a:rPr lang="en-US" b="1" dirty="0" smtClean="0"/>
+              <a:t>ARAP</a:t>
+            </a:r>
+            <a:r>
+              <a:rPr lang="en-US" dirty="0" smtClean="0"/>
+              <a:t> is an amateur radio access point</a:t>
+            </a:r>
+          </a:p>
+          <a:p>
+            <a:r>
+              <a:rPr lang="en-US" b="1" dirty="0" smtClean="0"/>
+              <a:t>User Terminals </a:t>
+            </a:r>
+            <a:r>
+              <a:rPr lang="en-US" dirty="0" smtClean="0"/>
+              <a:t>are individual Phase 4 radios</a:t>
+            </a:r>
+            <a:endParaRPr lang="en-US" dirty="0"/>
+          </a:p>
+        </p:txBody>
+      </p:sp>
+    </p:spTree>
+    <p:extLst>
+      <p:ext uri="{BB962C8B-B14F-4D97-AF65-F5344CB8AC3E}">
+        <p14:creationId xmlns:p14="http://schemas.microsoft.com/office/powerpoint/2010/main" val="50584502"/>
+      </p:ext>
+    </p:extLst>
+  </p:cSld>
+  <p:clrMapOvr>
+    <a:masterClrMapping/>
+  </p:clrMapOvr>
+  <p:transition xmlns:p14="http://schemas.microsoft.com/office/powerpoint/2010/main" spd="slow">
+    <p:fade/>
+  </p:transition>
+</p:sld>
+</file>
+
+<file path=ppt/slides/slide14.xml><?xml version="1.0" encoding="utf-8"?>
+<p:sld xmlns:a="http://schemas.openxmlformats.org/drawingml/2006/main" xmlns:r="http://schemas.openxmlformats.org/officeDocument/2006/relationships" xmlns:p="http://schemas.openxmlformats.org/presentationml/2006/main">
+  <p:cSld>
+    <p:spTree>
+      <p:nvGrpSpPr>
+        <p:cNvPr id="1" name=""/>
+        <p:cNvGrpSpPr/>
+        <p:nvPr/>
+      </p:nvGrpSpPr>
+      <p:grpSpPr>
+        <a:xfrm>
+          <a:off x="0" y="0"/>
+          <a:ext cx="0" cy="0"/>
+          <a:chOff x="0" y="0"/>
+          <a:chExt cx="0" cy="0"/>
+        </a:xfrm>
+      </p:grpSpPr>
+    </p:spTree>
+    <p:extLst>
+      <p:ext uri="{BB962C8B-B14F-4D97-AF65-F5344CB8AC3E}">
+        <p14:creationId xmlns:p14="http://schemas.microsoft.com/office/powerpoint/2010/main" val="2289557707"/>
+      </p:ext>
+    </p:extLst>
+  </p:cSld>
+  <p:clrMapOvr>
+    <a:masterClrMapping/>
+  </p:clrMapOvr>
+  <p:transition xmlns:p14="http://schemas.microsoft.com/office/powerpoint/2010/main" spd="slow">
+    <p:fade/>
+  </p:transition>
+</p:sld>
+</file>
+
+<file path=ppt/slides/slide15.xml><?xml version="1.0" encoding="utf-8"?>
+<p:sld xmlns:a="http://schemas.openxmlformats.org/drawingml/2006/main" xmlns:r="http://schemas.openxmlformats.org/officeDocument/2006/relationships" xmlns:p="http://schemas.openxmlformats.org/presentationml/2006/main">
+  <p:cSld>
+    <p:spTree>
+      <p:nvGrpSpPr>
+        <p:cNvPr id="1" name=""/>
+        <p:cNvGrpSpPr/>
+        <p:nvPr/>
+      </p:nvGrpSpPr>
+      <p:grpSpPr>
+        <a:xfrm>
+          <a:off x="0" y="0"/>
+          <a:ext cx="0" cy="0"/>
+          <a:chOff x="0" y="0"/>
+          <a:chExt cx="0" cy="0"/>
+        </a:xfrm>
+      </p:grpSpPr>
+      <p:pic>
+        <p:nvPicPr>
+          <p:cNvPr id="3" name="Picture 2" descr="ARAP_logo.png"/>
+          <p:cNvPicPr>
+            <a:picLocks noChangeAspect="1"/>
+          </p:cNvPicPr>
+          <p:nvPr/>
+        </p:nvPicPr>
+        <p:blipFill>
+          <a:blip r:embed="rId2" cstate="print">
+            <a:extLst>
+              <a:ext uri="{28A0092B-C50C-407E-A947-70E740481C1C}">
+                <a14:useLocalDpi xmlns:a14="http://schemas.microsoft.com/office/drawing/2010/main" val="0"/>
+              </a:ext>
+            </a:extLst>
+          </a:blip>
+          <a:stretch>
+            <a:fillRect/>
+          </a:stretch>
+        </p:blipFill>
+        <p:spPr>
+          <a:xfrm>
+            <a:off x="1371600" y="838200"/>
+            <a:ext cx="6248400" cy="5623560"/>
+          </a:xfrm>
+          <a:prstGeom prst="rect">
+            <a:avLst/>
+          </a:prstGeom>
+        </p:spPr>
+      </p:pic>
+    </p:spTree>
+    <p:extLst>
+      <p:ext uri="{BB962C8B-B14F-4D97-AF65-F5344CB8AC3E}">
+        <p14:creationId xmlns:p14="http://schemas.microsoft.com/office/powerpoint/2010/main" val="639644366"/>
+      </p:ext>
+    </p:extLst>
+  </p:cSld>
+  <p:clrMapOvr>
+    <a:masterClrMapping/>
+  </p:clrMapOvr>
+  <p:transition xmlns:p14="http://schemas.microsoft.com/office/powerpoint/2010/main" spd="slow">
+    <p:fade/>
+  </p:transition>
+</p:sld>
+</file>
+
+<file path=ppt/slides/slide16.xml><?xml version="1.0" encoding="utf-8"?>
 <p:sld xmlns:a="http://schemas.openxmlformats.org/drawingml/2006/main" xmlns:r="http://schemas.openxmlformats.org/officeDocument/2006/relationships" xmlns:p="http://schemas.openxmlformats.org/presentationml/2006/main">
   <p:cSld>
     <p:spTree>
@@ -37095,59 +37430,7 @@
 </p:sld>
 </file>
 
-<file path=ppt/slides/slide13.xml><?xml version="1.0" encoding="utf-8"?>
-<p:sld xmlns:a="http://schemas.openxmlformats.org/drawingml/2006/main" xmlns:r="http://schemas.openxmlformats.org/officeDocument/2006/relationships" xmlns:p="http://schemas.openxmlformats.org/presentationml/2006/main">
-  <p:cSld>
-    <p:spTree>
-      <p:nvGrpSpPr>
-        <p:cNvPr id="1" name=""/>
-        <p:cNvGrpSpPr/>
-        <p:nvPr/>
-      </p:nvGrpSpPr>
-      <p:grpSpPr>
-        <a:xfrm>
-          <a:off x="0" y="0"/>
-          <a:ext cx="0" cy="0"/>
-          <a:chOff x="0" y="0"/>
-          <a:chExt cx="0" cy="0"/>
-        </a:xfrm>
-      </p:grpSpPr>
-      <p:sp>
-        <p:nvSpPr>
-          <p:cNvPr id="2" name="Title 1"/>
-          <p:cNvSpPr>
-            <a:spLocks noGrp="1"/>
-          </p:cNvSpPr>
-          <p:nvPr>
-            <p:ph type="title"/>
-          </p:nvPr>
-        </p:nvSpPr>
-        <p:spPr/>
-        <p:txBody>
-          <a:bodyPr/>
-          <a:lstStyle/>
-          <a:p>
-            <a:endParaRPr lang="en-US"/>
-          </a:p>
-        </p:txBody>
-      </p:sp>
-    </p:spTree>
-    <p:extLst>
-      <p:ext uri="{BB962C8B-B14F-4D97-AF65-F5344CB8AC3E}">
-        <p14:creationId xmlns:p14="http://schemas.microsoft.com/office/powerpoint/2010/main" val="639644366"/>
-      </p:ext>
-    </p:extLst>
-  </p:cSld>
-  <p:clrMapOvr>
-    <a:masterClrMapping/>
-  </p:clrMapOvr>
-  <p:transition xmlns:p14="http://schemas.microsoft.com/office/powerpoint/2010/main" spd="slow">
-    <p:fade/>
-  </p:transition>
-</p:sld>
-</file>
-
-<file path=ppt/slides/slide14.xml><?xml version="1.0" encoding="utf-8"?>
+<file path=ppt/slides/slide17.xml><?xml version="1.0" encoding="utf-8"?>
 <p:sld xmlns:a="http://schemas.openxmlformats.org/drawingml/2006/main" xmlns:r="http://schemas.openxmlformats.org/officeDocument/2006/relationships" xmlns:p="http://schemas.openxmlformats.org/presentationml/2006/main">
   <p:cSld>
     <p:spTree>
@@ -37731,7 +38014,7 @@
 </p:sld>
 </file>
 
-<file path=ppt/slides/slide15.xml><?xml version="1.0" encoding="utf-8"?>
+<file path=ppt/slides/slide18.xml><?xml version="1.0" encoding="utf-8"?>
 <p:sld xmlns:a="http://schemas.openxmlformats.org/drawingml/2006/main" xmlns:r="http://schemas.openxmlformats.org/officeDocument/2006/relationships" xmlns:p="http://schemas.openxmlformats.org/presentationml/2006/main">
   <p:cSld>
     <p:spTree>
@@ -37909,7 +38192,7 @@
 </p:sld>
 </file>
 
-<file path=ppt/slides/slide16.xml><?xml version="1.0" encoding="utf-8"?>
+<file path=ppt/slides/slide19.xml><?xml version="1.0" encoding="utf-8"?>
 <p:sld xmlns:a="http://schemas.openxmlformats.org/drawingml/2006/main" xmlns:r="http://schemas.openxmlformats.org/officeDocument/2006/relationships" xmlns:p="http://schemas.openxmlformats.org/presentationml/2006/main">
   <p:cSld>
     <p:spTree>
@@ -38152,215 +38435,6 @@
 </p:sld>
 </file>
 
-<file path=ppt/slides/slide17.xml><?xml version="1.0" encoding="utf-8"?>
-<p:sld xmlns:a="http://schemas.openxmlformats.org/drawingml/2006/main" xmlns:r="http://schemas.openxmlformats.org/officeDocument/2006/relationships" xmlns:p="http://schemas.openxmlformats.org/presentationml/2006/main">
-  <p:cSld>
-    <p:spTree>
-      <p:nvGrpSpPr>
-        <p:cNvPr id="1" name=""/>
-        <p:cNvGrpSpPr/>
-        <p:nvPr/>
-      </p:nvGrpSpPr>
-      <p:grpSpPr>
-        <a:xfrm>
-          <a:off x="0" y="0"/>
-          <a:ext cx="0" cy="0"/>
-          <a:chOff x="0" y="0"/>
-          <a:chExt cx="0" cy="0"/>
-        </a:xfrm>
-      </p:grpSpPr>
-      <p:sp>
-        <p:nvSpPr>
-          <p:cNvPr id="2" name="Title 1"/>
-          <p:cNvSpPr>
-            <a:spLocks noGrp="1"/>
-          </p:cNvSpPr>
-          <p:nvPr>
-            <p:ph type="title"/>
-          </p:nvPr>
-        </p:nvSpPr>
-        <p:spPr/>
-        <p:txBody>
-          <a:bodyPr/>
-          <a:lstStyle/>
-          <a:p>
-            <a:r>
-              <a:rPr lang="en-US" dirty="0" smtClean="0"/>
-              <a:t>Appendix</a:t>
-            </a:r>
-            <a:endParaRPr lang="en-US" dirty="0"/>
-          </a:p>
-        </p:txBody>
-      </p:sp>
-      <p:sp>
-        <p:nvSpPr>
-          <p:cNvPr id="3" name="Text Placeholder 2"/>
-          <p:cNvSpPr>
-            <a:spLocks noGrp="1"/>
-          </p:cNvSpPr>
-          <p:nvPr>
-            <p:ph type="body" idx="1"/>
-          </p:nvPr>
-        </p:nvSpPr>
-        <p:spPr/>
-        <p:txBody>
-          <a:bodyPr/>
-          <a:lstStyle/>
-          <a:p>
-            <a:endParaRPr lang="en-US" dirty="0"/>
-          </a:p>
-        </p:txBody>
-      </p:sp>
-    </p:spTree>
-  </p:cSld>
-  <p:clrMapOvr>
-    <a:masterClrMapping/>
-  </p:clrMapOvr>
-  <p:transition xmlns:p14="http://schemas.microsoft.com/office/powerpoint/2010/main" spd="slow">
-    <p:fade/>
-  </p:transition>
-  <p:timing>
-    <p:tnLst>
-      <p:par>
-        <p:cTn xmlns:p14="http://schemas.microsoft.com/office/powerpoint/2010/main" id="1" dur="indefinite" restart="never" nodeType="tmRoot"/>
-      </p:par>
-    </p:tnLst>
-  </p:timing>
-</p:sld>
-</file>
-
-<file path=ppt/slides/slide18.xml><?xml version="1.0" encoding="utf-8"?>
-<p:sld xmlns:a="http://schemas.openxmlformats.org/drawingml/2006/main" xmlns:r="http://schemas.openxmlformats.org/officeDocument/2006/relationships" xmlns:p="http://schemas.openxmlformats.org/presentationml/2006/main">
-  <p:cSld>
-    <p:spTree>
-      <p:nvGrpSpPr>
-        <p:cNvPr id="1" name=""/>
-        <p:cNvGrpSpPr/>
-        <p:nvPr/>
-      </p:nvGrpSpPr>
-      <p:grpSpPr>
-        <a:xfrm>
-          <a:off x="0" y="0"/>
-          <a:ext cx="0" cy="0"/>
-          <a:chOff x="0" y="0"/>
-          <a:chExt cx="0" cy="0"/>
-        </a:xfrm>
-      </p:grpSpPr>
-      <p:sp>
-        <p:nvSpPr>
-          <p:cNvPr id="2" name="Title 1"/>
-          <p:cNvSpPr>
-            <a:spLocks noGrp="1"/>
-          </p:cNvSpPr>
-          <p:nvPr>
-            <p:ph type="title"/>
-          </p:nvPr>
-        </p:nvSpPr>
-        <p:spPr/>
-        <p:txBody>
-          <a:bodyPr/>
-          <a:lstStyle/>
-          <a:p>
-            <a:r>
-              <a:rPr lang="en-US" dirty="0" smtClean="0"/>
-              <a:t>Appendix</a:t>
-            </a:r>
-            <a:endParaRPr lang="en-US" dirty="0"/>
-          </a:p>
-        </p:txBody>
-      </p:sp>
-      <p:sp>
-        <p:nvSpPr>
-          <p:cNvPr id="3" name="Content Placeholder 2"/>
-          <p:cNvSpPr>
-            <a:spLocks noGrp="1"/>
-          </p:cNvSpPr>
-          <p:nvPr>
-            <p:ph idx="1"/>
-          </p:nvPr>
-        </p:nvSpPr>
-        <p:spPr/>
-        <p:txBody>
-          <a:bodyPr/>
-          <a:lstStyle/>
-          <a:p>
-            <a:pPr>
-              <a:lnSpc>
-                <a:spcPct val="150000"/>
-              </a:lnSpc>
-            </a:pPr>
-            <a:r>
-              <a:rPr lang="en-US" dirty="0" smtClean="0"/>
-              <a:t>Budget</a:t>
-            </a:r>
-          </a:p>
-          <a:p>
-            <a:pPr>
-              <a:lnSpc>
-                <a:spcPct val="150000"/>
-              </a:lnSpc>
-            </a:pPr>
-            <a:r>
-              <a:rPr lang="en-US" baseline="0" dirty="0" smtClean="0"/>
-              <a:t>Design documents</a:t>
-            </a:r>
-          </a:p>
-          <a:p>
-            <a:pPr>
-              <a:lnSpc>
-                <a:spcPct val="150000"/>
-              </a:lnSpc>
-            </a:pPr>
-            <a:r>
-              <a:rPr lang="en-US" dirty="0" smtClean="0"/>
-              <a:t>Marketing plan</a:t>
-            </a:r>
-            <a:endParaRPr lang="en-US" baseline="0" dirty="0" smtClean="0"/>
-          </a:p>
-          <a:p>
-            <a:pPr>
-              <a:lnSpc>
-                <a:spcPct val="150000"/>
-              </a:lnSpc>
-            </a:pPr>
-            <a:r>
-              <a:rPr lang="en-US" dirty="0" smtClean="0"/>
-              <a:t>Supplemental documents</a:t>
-            </a:r>
-            <a:endParaRPr lang="en-US" baseline="0" dirty="0" smtClean="0"/>
-          </a:p>
-          <a:p>
-            <a:pPr>
-              <a:lnSpc>
-                <a:spcPct val="150000"/>
-              </a:lnSpc>
-            </a:pPr>
-            <a:r>
-              <a:rPr lang="en-US" baseline="0" dirty="0" smtClean="0"/>
-              <a:t>Contact information</a:t>
-            </a:r>
-            <a:endParaRPr lang="en-US" dirty="0"/>
-          </a:p>
-        </p:txBody>
-      </p:sp>
-    </p:spTree>
-  </p:cSld>
-  <p:clrMapOvr>
-    <a:masterClrMapping/>
-  </p:clrMapOvr>
-  <p:transition xmlns:p14="http://schemas.microsoft.com/office/powerpoint/2010/main" spd="slow">
-    <p:fade/>
-  </p:transition>
-  <p:timing>
-    <p:tnLst>
-      <p:par>
-        <p:cTn xmlns:p14="http://schemas.microsoft.com/office/powerpoint/2010/main" id="1" dur="indefinite" restart="never" nodeType="tmRoot"/>
-      </p:par>
-    </p:tnLst>
-  </p:timing>
-</p:sld>
-</file>
-
 <file path=ppt/slides/slide2.xml><?xml version="1.0" encoding="utf-8"?>
 <p:sld xmlns:a="http://schemas.openxmlformats.org/drawingml/2006/main" xmlns:r="http://schemas.openxmlformats.org/officeDocument/2006/relationships" xmlns:p="http://schemas.openxmlformats.org/presentationml/2006/main">
   <p:cSld>
@@ -38544,6 +38618,215 @@
 </p:sld>
 </file>
 
+<file path=ppt/slides/slide20.xml><?xml version="1.0" encoding="utf-8"?>
+<p:sld xmlns:a="http://schemas.openxmlformats.org/drawingml/2006/main" xmlns:r="http://schemas.openxmlformats.org/officeDocument/2006/relationships" xmlns:p="http://schemas.openxmlformats.org/presentationml/2006/main">
+  <p:cSld>
+    <p:spTree>
+      <p:nvGrpSpPr>
+        <p:cNvPr id="1" name=""/>
+        <p:cNvGrpSpPr/>
+        <p:nvPr/>
+      </p:nvGrpSpPr>
+      <p:grpSpPr>
+        <a:xfrm>
+          <a:off x="0" y="0"/>
+          <a:ext cx="0" cy="0"/>
+          <a:chOff x="0" y="0"/>
+          <a:chExt cx="0" cy="0"/>
+        </a:xfrm>
+      </p:grpSpPr>
+      <p:sp>
+        <p:nvSpPr>
+          <p:cNvPr id="2" name="Title 1"/>
+          <p:cNvSpPr>
+            <a:spLocks noGrp="1"/>
+          </p:cNvSpPr>
+          <p:nvPr>
+            <p:ph type="title"/>
+          </p:nvPr>
+        </p:nvSpPr>
+        <p:spPr/>
+        <p:txBody>
+          <a:bodyPr/>
+          <a:lstStyle/>
+          <a:p>
+            <a:r>
+              <a:rPr lang="en-US" dirty="0" smtClean="0"/>
+              <a:t>Appendix</a:t>
+            </a:r>
+            <a:endParaRPr lang="en-US" dirty="0"/>
+          </a:p>
+        </p:txBody>
+      </p:sp>
+      <p:sp>
+        <p:nvSpPr>
+          <p:cNvPr id="3" name="Text Placeholder 2"/>
+          <p:cNvSpPr>
+            <a:spLocks noGrp="1"/>
+          </p:cNvSpPr>
+          <p:nvPr>
+            <p:ph type="body" idx="1"/>
+          </p:nvPr>
+        </p:nvSpPr>
+        <p:spPr/>
+        <p:txBody>
+          <a:bodyPr/>
+          <a:lstStyle/>
+          <a:p>
+            <a:endParaRPr lang="en-US" dirty="0"/>
+          </a:p>
+        </p:txBody>
+      </p:sp>
+    </p:spTree>
+  </p:cSld>
+  <p:clrMapOvr>
+    <a:masterClrMapping/>
+  </p:clrMapOvr>
+  <p:transition xmlns:p14="http://schemas.microsoft.com/office/powerpoint/2010/main" spd="slow">
+    <p:fade/>
+  </p:transition>
+  <p:timing>
+    <p:tnLst>
+      <p:par>
+        <p:cTn xmlns:p14="http://schemas.microsoft.com/office/powerpoint/2010/main" id="1" dur="indefinite" restart="never" nodeType="tmRoot"/>
+      </p:par>
+    </p:tnLst>
+  </p:timing>
+</p:sld>
+</file>
+
+<file path=ppt/slides/slide21.xml><?xml version="1.0" encoding="utf-8"?>
+<p:sld xmlns:a="http://schemas.openxmlformats.org/drawingml/2006/main" xmlns:r="http://schemas.openxmlformats.org/officeDocument/2006/relationships" xmlns:p="http://schemas.openxmlformats.org/presentationml/2006/main">
+  <p:cSld>
+    <p:spTree>
+      <p:nvGrpSpPr>
+        <p:cNvPr id="1" name=""/>
+        <p:cNvGrpSpPr/>
+        <p:nvPr/>
+      </p:nvGrpSpPr>
+      <p:grpSpPr>
+        <a:xfrm>
+          <a:off x="0" y="0"/>
+          <a:ext cx="0" cy="0"/>
+          <a:chOff x="0" y="0"/>
+          <a:chExt cx="0" cy="0"/>
+        </a:xfrm>
+      </p:grpSpPr>
+      <p:sp>
+        <p:nvSpPr>
+          <p:cNvPr id="2" name="Title 1"/>
+          <p:cNvSpPr>
+            <a:spLocks noGrp="1"/>
+          </p:cNvSpPr>
+          <p:nvPr>
+            <p:ph type="title"/>
+          </p:nvPr>
+        </p:nvSpPr>
+        <p:spPr/>
+        <p:txBody>
+          <a:bodyPr/>
+          <a:lstStyle/>
+          <a:p>
+            <a:r>
+              <a:rPr lang="en-US" dirty="0" smtClean="0"/>
+              <a:t>Appendix</a:t>
+            </a:r>
+            <a:endParaRPr lang="en-US" dirty="0"/>
+          </a:p>
+        </p:txBody>
+      </p:sp>
+      <p:sp>
+        <p:nvSpPr>
+          <p:cNvPr id="3" name="Content Placeholder 2"/>
+          <p:cNvSpPr>
+            <a:spLocks noGrp="1"/>
+          </p:cNvSpPr>
+          <p:nvPr>
+            <p:ph idx="1"/>
+          </p:nvPr>
+        </p:nvSpPr>
+        <p:spPr/>
+        <p:txBody>
+          <a:bodyPr/>
+          <a:lstStyle/>
+          <a:p>
+            <a:pPr>
+              <a:lnSpc>
+                <a:spcPct val="150000"/>
+              </a:lnSpc>
+            </a:pPr>
+            <a:r>
+              <a:rPr lang="en-US" dirty="0" smtClean="0"/>
+              <a:t>Budget</a:t>
+            </a:r>
+          </a:p>
+          <a:p>
+            <a:pPr>
+              <a:lnSpc>
+                <a:spcPct val="150000"/>
+              </a:lnSpc>
+            </a:pPr>
+            <a:r>
+              <a:rPr lang="en-US" baseline="0" dirty="0" smtClean="0"/>
+              <a:t>Design documents</a:t>
+            </a:r>
+          </a:p>
+          <a:p>
+            <a:pPr>
+              <a:lnSpc>
+                <a:spcPct val="150000"/>
+              </a:lnSpc>
+            </a:pPr>
+            <a:r>
+              <a:rPr lang="en-US" dirty="0" smtClean="0"/>
+              <a:t>Marketing plan</a:t>
+            </a:r>
+            <a:endParaRPr lang="en-US" baseline="0" dirty="0" smtClean="0"/>
+          </a:p>
+          <a:p>
+            <a:pPr>
+              <a:lnSpc>
+                <a:spcPct val="150000"/>
+              </a:lnSpc>
+            </a:pPr>
+            <a:r>
+              <a:rPr lang="en-US" dirty="0" smtClean="0"/>
+              <a:t>Supplemental documents</a:t>
+            </a:r>
+            <a:endParaRPr lang="en-US" baseline="0" dirty="0" smtClean="0"/>
+          </a:p>
+          <a:p>
+            <a:pPr>
+              <a:lnSpc>
+                <a:spcPct val="150000"/>
+              </a:lnSpc>
+            </a:pPr>
+            <a:r>
+              <a:rPr lang="en-US" baseline="0" dirty="0" smtClean="0"/>
+              <a:t>Contact information</a:t>
+            </a:r>
+            <a:endParaRPr lang="en-US" dirty="0"/>
+          </a:p>
+        </p:txBody>
+      </p:sp>
+    </p:spTree>
+  </p:cSld>
+  <p:clrMapOvr>
+    <a:masterClrMapping/>
+  </p:clrMapOvr>
+  <p:transition xmlns:p14="http://schemas.microsoft.com/office/powerpoint/2010/main" spd="slow">
+    <p:fade/>
+  </p:transition>
+  <p:timing>
+    <p:tnLst>
+      <p:par>
+        <p:cTn xmlns:p14="http://schemas.microsoft.com/office/powerpoint/2010/main" id="1" dur="indefinite" restart="never" nodeType="tmRoot"/>
+      </p:par>
+    </p:tnLst>
+  </p:timing>
+</p:sld>
+</file>
+
 <file path=ppt/slides/slide3.xml><?xml version="1.0" encoding="utf-8"?>
 <p:sld xmlns:a="http://schemas.openxmlformats.org/drawingml/2006/main" xmlns:r="http://schemas.openxmlformats.org/officeDocument/2006/relationships" xmlns:p="http://schemas.openxmlformats.org/presentationml/2006/main">
   <p:cSld>
@@ -38568,7 +38851,7 @@
           <p:nvPr>
             <p:extLst>
               <p:ext uri="{D42A27DB-BD31-4B8C-83A1-F6EECF244321}">
-                <p14:modId xmlns:p14="http://schemas.microsoft.com/office/powerpoint/2010/main" val="1058536393"/>
+                <p14:modId xmlns:p14="http://schemas.microsoft.com/office/powerpoint/2010/main" val="153302985"/>
               </p:ext>
             </p:extLst>
           </p:nvPr>
@@ -40258,6 +40541,161 @@
       </p:grpSpPr>
       <p:sp>
         <p:nvSpPr>
+          <p:cNvPr id="3" name="Title 2"/>
+          <p:cNvSpPr>
+            <a:spLocks noGrp="1"/>
+          </p:cNvSpPr>
+          <p:nvPr>
+            <p:ph type="title"/>
+          </p:nvPr>
+        </p:nvSpPr>
+        <p:spPr/>
+        <p:txBody>
+          <a:bodyPr/>
+          <a:lstStyle/>
+          <a:p>
+            <a:r>
+              <a:rPr lang="en-US" dirty="0" smtClean="0"/>
+              <a:t>Phase 4 – Not Just a Satellite Project</a:t>
+            </a:r>
+            <a:endParaRPr lang="en-US" dirty="0"/>
+          </a:p>
+        </p:txBody>
+      </p:sp>
+      <p:sp>
+        <p:nvSpPr>
+          <p:cNvPr id="6" name="Text Placeholder 5"/>
+          <p:cNvSpPr>
+            <a:spLocks noGrp="1"/>
+          </p:cNvSpPr>
+          <p:nvPr>
+            <p:ph type="body" idx="1"/>
+          </p:nvPr>
+        </p:nvSpPr>
+        <p:spPr/>
+        <p:txBody>
+          <a:bodyPr/>
+          <a:lstStyle/>
+          <a:p>
+            <a:r>
+              <a:rPr lang="en-US" dirty="0" smtClean="0"/>
+              <a:t>Satellite Service</a:t>
+            </a:r>
+            <a:endParaRPr lang="en-US" dirty="0"/>
+          </a:p>
+        </p:txBody>
+      </p:sp>
+      <p:sp>
+        <p:nvSpPr>
+          <p:cNvPr id="4" name="Content Placeholder 3"/>
+          <p:cNvSpPr>
+            <a:spLocks noGrp="1"/>
+          </p:cNvSpPr>
+          <p:nvPr>
+            <p:ph sz="half" idx="2"/>
+          </p:nvPr>
+        </p:nvSpPr>
+        <p:spPr/>
+        <p:txBody>
+          <a:bodyPr>
+            <a:normAutofit/>
+          </a:bodyPr>
+          <a:lstStyle/>
+          <a:p>
+            <a:pPr marL="0" indent="0">
+              <a:buNone/>
+            </a:pPr>
+            <a:r>
+              <a:rPr lang="en-US" dirty="0" smtClean="0"/>
+              <a:t>This mission (Phase 4b) is expected to last at least a year, but possibly more, before the satellite is placed in a parking orbit. This means that satellite service will be for a limited time on this mission. We are hoping to leverage this successful mission into having our own geosynchronous satellite (or satellites) with a longer life. Phase 4a is a AMSAT-DN project.</a:t>
+            </a:r>
+          </a:p>
+        </p:txBody>
+      </p:sp>
+      <p:sp>
+        <p:nvSpPr>
+          <p:cNvPr id="7" name="Text Placeholder 6"/>
+          <p:cNvSpPr>
+            <a:spLocks noGrp="1"/>
+          </p:cNvSpPr>
+          <p:nvPr>
+            <p:ph type="body" sz="quarter" idx="3"/>
+          </p:nvPr>
+        </p:nvSpPr>
+        <p:spPr/>
+        <p:txBody>
+          <a:bodyPr/>
+          <a:lstStyle/>
+          <a:p>
+            <a:r>
+              <a:rPr lang="en-US" dirty="0" smtClean="0"/>
+              <a:t>Terrestrial Service</a:t>
+            </a:r>
+            <a:endParaRPr lang="en-US" dirty="0"/>
+          </a:p>
+        </p:txBody>
+      </p:sp>
+      <p:sp>
+        <p:nvSpPr>
+          <p:cNvPr id="5" name="Content Placeholder 4"/>
+          <p:cNvSpPr>
+            <a:spLocks noGrp="1"/>
+          </p:cNvSpPr>
+          <p:nvPr>
+            <p:ph sz="quarter" idx="4"/>
+          </p:nvPr>
+        </p:nvSpPr>
+        <p:spPr/>
+        <p:txBody>
+          <a:bodyPr/>
+          <a:lstStyle/>
+          <a:p>
+            <a:pPr marL="0" indent="0">
+              <a:buNone/>
+            </a:pPr>
+            <a:r>
+              <a:rPr lang="en-US" dirty="0" smtClean="0"/>
+              <a:t>Using the launch as a motivator, we will create ground stations and equipment that will live on past the satellite mission. Terrestrial service is built-in from the beginning. The system will be fun, useful, reconfigurable, powerful, and will make getting on the microwave bands much easier and much more accessible than they have been in the recent past. Use them or lose them!</a:t>
+            </a:r>
+            <a:endParaRPr lang="en-US" dirty="0"/>
+          </a:p>
+        </p:txBody>
+      </p:sp>
+    </p:spTree>
+    <p:extLst>
+      <p:ext uri="{BB962C8B-B14F-4D97-AF65-F5344CB8AC3E}">
+        <p14:creationId xmlns:p14="http://schemas.microsoft.com/office/powerpoint/2010/main" val="3804217078"/>
+      </p:ext>
+    </p:extLst>
+  </p:cSld>
+  <p:clrMapOvr>
+    <a:masterClrMapping/>
+  </p:clrMapOvr>
+  <p:transition xmlns:p14="http://schemas.microsoft.com/office/powerpoint/2010/main" spd="slow">
+    <p:fade/>
+  </p:transition>
+</p:sld>
+</file>
+
+<file path=ppt/slides/slide5.xml><?xml version="1.0" encoding="utf-8"?>
+<p:sld xmlns:a="http://schemas.openxmlformats.org/drawingml/2006/main" xmlns:r="http://schemas.openxmlformats.org/officeDocument/2006/relationships" xmlns:p="http://schemas.openxmlformats.org/presentationml/2006/main">
+  <p:cSld>
+    <p:spTree>
+      <p:nvGrpSpPr>
+        <p:cNvPr id="1" name=""/>
+        <p:cNvGrpSpPr/>
+        <p:nvPr/>
+      </p:nvGrpSpPr>
+      <p:grpSpPr>
+        <a:xfrm>
+          <a:off x="0" y="0"/>
+          <a:ext cx="0" cy="0"/>
+          <a:chOff x="0" y="0"/>
+          <a:chExt cx="0" cy="0"/>
+        </a:xfrm>
+      </p:grpSpPr>
+      <p:sp>
+        <p:nvSpPr>
           <p:cNvPr id="2" name="Title 1"/>
           <p:cNvSpPr>
             <a:spLocks noGrp="1"/>
@@ -40505,7 +40943,7 @@
 </p:sld>
 </file>
 
-<file path=ppt/slides/slide5.xml><?xml version="1.0" encoding="utf-8"?>
+<file path=ppt/slides/slide6.xml><?xml version="1.0" encoding="utf-8"?>
 <p:sld xmlns:a="http://schemas.openxmlformats.org/drawingml/2006/main" xmlns:r="http://schemas.openxmlformats.org/officeDocument/2006/relationships" xmlns:p="http://schemas.openxmlformats.org/presentationml/2006/main">
   <p:cSld>
     <p:spTree>
@@ -40586,7 +41024,7 @@
 </p:sld>
 </file>
 
-<file path=ppt/slides/slide6.xml><?xml version="1.0" encoding="utf-8"?>
+<file path=ppt/slides/slide7.xml><?xml version="1.0" encoding="utf-8"?>
 <p:sld xmlns:a="http://schemas.openxmlformats.org/drawingml/2006/main" xmlns:r="http://schemas.openxmlformats.org/officeDocument/2006/relationships" xmlns:p="http://schemas.openxmlformats.org/presentationml/2006/main">
   <p:cSld>
     <p:spTree>
@@ -40783,7 +41221,7 @@
 </p:sld>
 </file>
 
-<file path=ppt/slides/slide7.xml><?xml version="1.0" encoding="utf-8"?>
+<file path=ppt/slides/slide8.xml><?xml version="1.0" encoding="utf-8"?>
 <p:sld xmlns:a="http://schemas.openxmlformats.org/drawingml/2006/main" xmlns:r="http://schemas.openxmlformats.org/officeDocument/2006/relationships" xmlns:p="http://schemas.openxmlformats.org/presentationml/2006/main">
   <p:cSld>
     <p:spTree>
@@ -40941,7 +41379,7 @@
 </p:sld>
 </file>
 
-<file path=ppt/slides/slide8.xml><?xml version="1.0" encoding="utf-8"?>
+<file path=ppt/slides/slide9.xml><?xml version="1.0" encoding="utf-8"?>
 <p:sld xmlns:a="http://schemas.openxmlformats.org/drawingml/2006/main" xmlns:r="http://schemas.openxmlformats.org/officeDocument/2006/relationships" xmlns:p="http://schemas.openxmlformats.org/presentationml/2006/main">
   <p:cSld>
     <p:spTree>
@@ -41107,99 +41545,6 @@
     <p:extLst>
       <p:ext uri="{BB962C8B-B14F-4D97-AF65-F5344CB8AC3E}">
         <p14:creationId xmlns:p14="http://schemas.microsoft.com/office/powerpoint/2010/main" val="2169168539"/>
-      </p:ext>
-    </p:extLst>
-  </p:cSld>
-  <p:clrMapOvr>
-    <a:masterClrMapping/>
-  </p:clrMapOvr>
-  <p:transition xmlns:p14="http://schemas.microsoft.com/office/powerpoint/2010/main" spd="slow">
-    <p:fade/>
-  </p:transition>
-  <p:timing>
-    <p:tnLst>
-      <p:par>
-        <p:cTn xmlns:p14="http://schemas.microsoft.com/office/powerpoint/2010/main" id="1" dur="indefinite" restart="never" nodeType="tmRoot"/>
-      </p:par>
-    </p:tnLst>
-  </p:timing>
-</p:sld>
-</file>
-
-<file path=ppt/slides/slide9.xml><?xml version="1.0" encoding="utf-8"?>
-<p:sld xmlns:a="http://schemas.openxmlformats.org/drawingml/2006/main" xmlns:r="http://schemas.openxmlformats.org/officeDocument/2006/relationships" xmlns:p="http://schemas.openxmlformats.org/presentationml/2006/main">
-  <p:cSld>
-    <p:spTree>
-      <p:nvGrpSpPr>
-        <p:cNvPr id="1" name=""/>
-        <p:cNvGrpSpPr/>
-        <p:nvPr/>
-      </p:nvGrpSpPr>
-      <p:grpSpPr>
-        <a:xfrm>
-          <a:off x="0" y="0"/>
-          <a:ext cx="0" cy="0"/>
-          <a:chOff x="0" y="0"/>
-          <a:chExt cx="0" cy="0"/>
-        </a:xfrm>
-      </p:grpSpPr>
-      <p:sp>
-        <p:nvSpPr>
-          <p:cNvPr id="11" name="Title 10"/>
-          <p:cNvSpPr>
-            <a:spLocks noGrp="1"/>
-          </p:cNvSpPr>
-          <p:nvPr>
-            <p:ph type="title"/>
-          </p:nvPr>
-        </p:nvSpPr>
-        <p:spPr/>
-        <p:txBody>
-          <a:bodyPr/>
-          <a:lstStyle/>
-          <a:p>
-            <a:r>
-              <a:rPr lang="en-US" dirty="0" smtClean="0"/>
-              <a:t>Phase 4 Ground Team Structure</a:t>
-            </a:r>
-            <a:endParaRPr lang="en-US" dirty="0"/>
-          </a:p>
-        </p:txBody>
-      </p:sp>
-      <p:pic>
-        <p:nvPicPr>
-          <p:cNvPr id="13" name="Picture 12" descr="herd_of_cats.jpg"/>
-          <p:cNvPicPr>
-            <a:picLocks noChangeAspect="1"/>
-          </p:cNvPicPr>
-          <p:nvPr/>
-        </p:nvPicPr>
-        <p:blipFill>
-          <a:blip r:embed="rId3">
-            <a:extLst>
-              <a:ext uri="{28A0092B-C50C-407E-A947-70E740481C1C}">
-                <a14:useLocalDpi xmlns:a14="http://schemas.microsoft.com/office/drawing/2010/main" val="0"/>
-              </a:ext>
-            </a:extLst>
-          </a:blip>
-          <a:stretch>
-            <a:fillRect/>
-          </a:stretch>
-        </p:blipFill>
-        <p:spPr>
-          <a:xfrm>
-            <a:off x="304800" y="1676400"/>
-            <a:ext cx="8496300" cy="4787900"/>
-          </a:xfrm>
-          <a:prstGeom prst="rect">
-            <a:avLst/>
-          </a:prstGeom>
-        </p:spPr>
-      </p:pic>
-    </p:spTree>
-    <p:extLst>
-      <p:ext uri="{BB962C8B-B14F-4D97-AF65-F5344CB8AC3E}">
-        <p14:creationId xmlns:p14="http://schemas.microsoft.com/office/powerpoint/2010/main" val="1936543360"/>
       </p:ext>
     </p:extLst>
   </p:cSld>

</xml_diff>

<commit_message>
Added Slides for Use Cases
</commit_message>
<xml_diff>
--- a/Papers_and_Presentations/PARC_4on4.pptx
+++ b/Papers_and_Presentations/PARC_4on4.pptx
@@ -5,30 +5,33 @@
     <p:sldMasterId id="2147483648" r:id="rId1"/>
   </p:sldMasterIdLst>
   <p:notesMasterIdLst>
-    <p:notesMasterId r:id="rId23"/>
+    <p:notesMasterId r:id="rId26"/>
   </p:notesMasterIdLst>
   <p:sldIdLst>
     <p:sldId id="259" r:id="rId2"/>
     <p:sldId id="261" r:id="rId3"/>
     <p:sldId id="266" r:id="rId4"/>
     <p:sldId id="279" r:id="rId5"/>
-    <p:sldId id="273" r:id="rId6"/>
-    <p:sldId id="272" r:id="rId7"/>
-    <p:sldId id="262" r:id="rId8"/>
-    <p:sldId id="263" r:id="rId9"/>
-    <p:sldId id="276" r:id="rId10"/>
-    <p:sldId id="275" r:id="rId11"/>
-    <p:sldId id="278" r:id="rId12"/>
-    <p:sldId id="277" r:id="rId13"/>
-    <p:sldId id="280" r:id="rId14"/>
-    <p:sldId id="281" r:id="rId15"/>
-    <p:sldId id="274" r:id="rId16"/>
-    <p:sldId id="264" r:id="rId17"/>
-    <p:sldId id="271" r:id="rId18"/>
-    <p:sldId id="267" r:id="rId19"/>
-    <p:sldId id="268" r:id="rId20"/>
-    <p:sldId id="269" r:id="rId21"/>
-    <p:sldId id="270" r:id="rId22"/>
+    <p:sldId id="282" r:id="rId6"/>
+    <p:sldId id="283" r:id="rId7"/>
+    <p:sldId id="284" r:id="rId8"/>
+    <p:sldId id="273" r:id="rId9"/>
+    <p:sldId id="272" r:id="rId10"/>
+    <p:sldId id="262" r:id="rId11"/>
+    <p:sldId id="263" r:id="rId12"/>
+    <p:sldId id="276" r:id="rId13"/>
+    <p:sldId id="275" r:id="rId14"/>
+    <p:sldId id="278" r:id="rId15"/>
+    <p:sldId id="277" r:id="rId16"/>
+    <p:sldId id="280" r:id="rId17"/>
+    <p:sldId id="281" r:id="rId18"/>
+    <p:sldId id="274" r:id="rId19"/>
+    <p:sldId id="264" r:id="rId20"/>
+    <p:sldId id="271" r:id="rId21"/>
+    <p:sldId id="267" r:id="rId22"/>
+    <p:sldId id="268" r:id="rId23"/>
+    <p:sldId id="269" r:id="rId24"/>
+    <p:sldId id="270" r:id="rId25"/>
   </p:sldIdLst>
   <p:sldSz cx="9144000" cy="6858000" type="screen4x3"/>
   <p:notesSz cx="6858000" cy="9144000"/>
@@ -140,6 +143,9 @@
             <p14:sldId id="261"/>
             <p14:sldId id="266"/>
             <p14:sldId id="279"/>
+            <p14:sldId id="282"/>
+            <p14:sldId id="283"/>
+            <p14:sldId id="284"/>
             <p14:sldId id="273"/>
             <p14:sldId id="272"/>
           </p14:sldIdLst>
@@ -6414,8 +6420,8 @@
   <dgm:cxnLst>
     <dgm:cxn modelId="{B4023F34-1758-4145-893F-044E6D16D52E}" srcId="{8BBD982B-F274-4BA3-8F19-028AA15117A4}" destId="{25761703-EE26-4CA8-B049-3F157889CE06}" srcOrd="2" destOrd="0" parTransId="{5EE1D751-E7E3-4E30-AC49-4C8227478F52}" sibTransId="{B74F6A51-714F-4AA7-B42B-E7F20847B954}"/>
     <dgm:cxn modelId="{B0DAC2FD-EDA1-441B-A845-0C1964D6B924}" srcId="{8BBD982B-F274-4BA3-8F19-028AA15117A4}" destId="{7BF07599-40A3-43F8-B74C-B9C9D197B9C8}" srcOrd="0" destOrd="0" parTransId="{05A33227-C3A2-40A7-900E-1D070E545DAC}" sibTransId="{347A4B58-92E3-49B2-BBF5-15BF5A0F478B}"/>
+    <dgm:cxn modelId="{CFFA721D-AFB6-8242-B730-DF15F569B17C}" srcId="{EB0B1996-313B-E245-957B-63F73EAAD945}" destId="{EEA32B6A-E304-6541-9946-E419B3071B71}" srcOrd="0" destOrd="0" parTransId="{1B6D66B5-FD52-7146-A21F-BED3506867B7}" sibTransId="{69B36C3C-05C6-5549-9274-5E175B98A997}"/>
     <dgm:cxn modelId="{4AEB220A-D04C-6B4A-83D3-50E3E6292CEB}" type="presOf" srcId="{B47584F3-674B-184A-8890-0EB1FB76E8D1}" destId="{4B1D116A-97D8-4F49-A3B4-CAF3F59798DF}" srcOrd="0" destOrd="1" presId="urn:microsoft.com/office/officeart/2005/8/layout/chevron1"/>
-    <dgm:cxn modelId="{CFFA721D-AFB6-8242-B730-DF15F569B17C}" srcId="{EB0B1996-313B-E245-957B-63F73EAAD945}" destId="{EEA32B6A-E304-6541-9946-E419B3071B71}" srcOrd="0" destOrd="0" parTransId="{1B6D66B5-FD52-7146-A21F-BED3506867B7}" sibTransId="{69B36C3C-05C6-5549-9274-5E175B98A997}"/>
     <dgm:cxn modelId="{E5874A28-9D4A-3349-9954-939DE5E9CABB}" type="presOf" srcId="{0344D70B-B8C9-4341-AB4A-ED3BF97CA174}" destId="{D5F02EDB-2CE3-BD49-8350-75AE280F7A69}" srcOrd="0" destOrd="0" presId="urn:microsoft.com/office/officeart/2005/8/layout/chevron1"/>
     <dgm:cxn modelId="{952DE77A-DF65-B149-9C3E-27C45695E911}" srcId="{EB0B1996-313B-E245-957B-63F73EAAD945}" destId="{B47584F3-674B-184A-8890-0EB1FB76E8D1}" srcOrd="1" destOrd="0" parTransId="{2B14717F-BC05-684C-A58C-F4F7795DB36A}" sibTransId="{94A304FC-25BD-0C41-8277-53DB95EC7AD6}"/>
     <dgm:cxn modelId="{6595D06A-FDFD-CB45-8C20-9C8AF8BE3E39}" type="presOf" srcId="{03ED028E-13DE-774E-B830-1B06E9459DB8}" destId="{B28826FA-0133-F04F-A724-48ADB5D79868}" srcOrd="0" destOrd="0" presId="urn:microsoft.com/office/officeart/2005/8/layout/chevron1"/>
@@ -8361,42 +8367,42 @@
     </dgm:pt>
   </dgm:ptLst>
   <dgm:cxnLst>
+    <dgm:cxn modelId="{40DF8889-F39C-6445-86DA-D9A284BD8624}" srcId="{F4AAB694-F90C-F34E-B8EC-3014E3A331C0}" destId="{F4DD572C-71D0-0145-86B3-19D40DE231F6}" srcOrd="1" destOrd="0" parTransId="{A9631989-F397-C940-9912-44AAD40FB609}" sibTransId="{A5046C3D-6435-2A4C-B88D-6BD9FFC52EEB}"/>
+    <dgm:cxn modelId="{BF529209-D843-E146-9EF7-BFABC7CF5CF8}" type="presOf" srcId="{F4DD572C-71D0-0145-86B3-19D40DE231F6}" destId="{B93AAE61-D6DA-6342-BF21-C91999009117}" srcOrd="0" destOrd="1" presId="urn:microsoft.com/office/officeart/2005/8/layout/hProcess4"/>
+    <dgm:cxn modelId="{1611DD28-AD2F-F94C-908E-138E32FB4391}" type="presOf" srcId="{43B25A67-922A-2041-AA3C-F8C6CB55B4E0}" destId="{79524DD6-4A31-2549-89BE-16FD1F96B4BC}" srcOrd="0" destOrd="0" presId="urn:microsoft.com/office/officeart/2005/8/layout/hProcess4"/>
+    <dgm:cxn modelId="{37B002B5-3CDE-CF44-9BB3-92A9B79FBE48}" srcId="{51B83B0F-3F8C-5C40-A2BE-5E68971439AD}" destId="{406E52C0-C70C-BE4D-8253-3096C307D87B}" srcOrd="2" destOrd="0" parTransId="{367BF942-1657-4742-A19C-9B1C92911E21}" sibTransId="{03C3A97C-7F74-AA41-85C4-8204BE425A63}"/>
+    <dgm:cxn modelId="{1DF64485-5459-7A44-96AC-CAA64E644AC3}" srcId="{1940AE72-4F72-4845-BA6F-73AEC80E09CD}" destId="{7876F7AB-81C6-CF44-AA9E-B306B3FD66AF}" srcOrd="0" destOrd="0" parTransId="{DAE7D269-70C5-8E4D-A959-9C32BF672A01}" sibTransId="{84C9F3F7-C9A6-3B4B-8EB4-CE6A67E71EA5}"/>
+    <dgm:cxn modelId="{9E66E1FB-4E8A-8B4E-81BC-7894DD124EAD}" type="presOf" srcId="{7876F7AB-81C6-CF44-AA9E-B306B3FD66AF}" destId="{42E3F9A2-D63C-9C4B-9BC1-6CE52CE90DDD}" srcOrd="1" destOrd="0" presId="urn:microsoft.com/office/officeart/2005/8/layout/hProcess4"/>
+    <dgm:cxn modelId="{8905941E-2FCC-A14A-8269-D2E222C7EED9}" type="presOf" srcId="{1FA5CE13-B0DC-7A46-B1D1-1AA705D61694}" destId="{7509BC23-1756-F343-BDB3-B8718AF3537C}" srcOrd="1" destOrd="1" presId="urn:microsoft.com/office/officeart/2005/8/layout/hProcess4"/>
+    <dgm:cxn modelId="{CF311D68-C395-B946-B42E-5BCF159C2D49}" type="presOf" srcId="{5D9183F3-6DD7-8D4D-9F55-73D2D5457884}" destId="{42E3F9A2-D63C-9C4B-9BC1-6CE52CE90DDD}" srcOrd="1" destOrd="1" presId="urn:microsoft.com/office/officeart/2005/8/layout/hProcess4"/>
+    <dgm:cxn modelId="{EB9E81AC-81E4-A243-8F6D-90122A3A9BEB}" srcId="{51B83B0F-3F8C-5C40-A2BE-5E68971439AD}" destId="{1940AE72-4F72-4845-BA6F-73AEC80E09CD}" srcOrd="1" destOrd="0" parTransId="{2F5BA100-CB2B-C744-B1BF-2D3F4962731F}" sibTransId="{AEF22083-608A-7A46-8BEE-986AA5389EF2}"/>
+    <dgm:cxn modelId="{14B57B7C-AED0-9744-9F1E-1DEEE1F9F35A}" type="presOf" srcId="{55622261-26B7-1846-B351-0409313808C4}" destId="{B736C658-477B-D043-8CDC-403671EE7D44}" srcOrd="0" destOrd="0" presId="urn:microsoft.com/office/officeart/2005/8/layout/hProcess4"/>
+    <dgm:cxn modelId="{91989CCD-5E71-9A44-9877-080B8BA04DE2}" type="presOf" srcId="{16C5F9F7-2F78-C94D-8508-0E70E8564E29}" destId="{B736C658-477B-D043-8CDC-403671EE7D44}" srcOrd="0" destOrd="1" presId="urn:microsoft.com/office/officeart/2005/8/layout/hProcess4"/>
+    <dgm:cxn modelId="{40A2E82C-92A9-5345-BD85-742401BE6164}" type="presOf" srcId="{7876F7AB-81C6-CF44-AA9E-B306B3FD66AF}" destId="{BB09D893-BEAE-DF49-88B8-D4C2CFAC2287}" srcOrd="0" destOrd="0" presId="urn:microsoft.com/office/officeart/2005/8/layout/hProcess4"/>
+    <dgm:cxn modelId="{2297A67A-6D79-2F4A-8D8E-221DD1E9F6CB}" type="presOf" srcId="{AEF22083-608A-7A46-8BEE-986AA5389EF2}" destId="{8538C183-8AFF-594A-9CBC-7403B42DFDD3}" srcOrd="0" destOrd="0" presId="urn:microsoft.com/office/officeart/2005/8/layout/hProcess4"/>
+    <dgm:cxn modelId="{F5E7F244-6CB1-8D46-BEE4-23F15B47D0B6}" type="presOf" srcId="{BD88C4C1-BF5B-9B43-B79F-EE249F95A5D8}" destId="{61E7ADA9-8BE6-3544-8CFC-C4E0092B71C2}" srcOrd="1" destOrd="0" presId="urn:microsoft.com/office/officeart/2005/8/layout/hProcess4"/>
+    <dgm:cxn modelId="{70A8FE90-25A1-CC42-B521-891A90721C69}" type="presOf" srcId="{03C3A97C-7F74-AA41-85C4-8204BE425A63}" destId="{280A4BBC-765D-D947-907A-D93B23586433}" srcOrd="0" destOrd="0" presId="urn:microsoft.com/office/officeart/2005/8/layout/hProcess4"/>
+    <dgm:cxn modelId="{5F9FFC6C-19A0-CB43-AB10-2C0ECCA24DFC}" type="presOf" srcId="{1FA5CE13-B0DC-7A46-B1D1-1AA705D61694}" destId="{ABD3ECA2-C9C6-EB46-9C23-C0E532FF6524}" srcOrd="0" destOrd="1" presId="urn:microsoft.com/office/officeart/2005/8/layout/hProcess4"/>
+    <dgm:cxn modelId="{E7B07684-4AEB-9547-A34A-33CB47C84024}" srcId="{51B83B0F-3F8C-5C40-A2BE-5E68971439AD}" destId="{43B25A67-922A-2041-AA3C-F8C6CB55B4E0}" srcOrd="0" destOrd="0" parTransId="{3416ED5C-1936-8E42-96D2-EBADC6BD3947}" sibTransId="{3B2A067C-7E16-4245-ABE0-2CFE5012049B}"/>
+    <dgm:cxn modelId="{1E6F7CE2-504F-2842-8240-D7AA7212942A}" srcId="{F4AAB694-F90C-F34E-B8EC-3014E3A331C0}" destId="{BD88C4C1-BF5B-9B43-B79F-EE249F95A5D8}" srcOrd="0" destOrd="0" parTransId="{38ECD1B8-F84A-F54F-A7F0-CB5F58A93933}" sibTransId="{21D611DC-C4F8-6B44-AFA4-9700C74C7CB5}"/>
+    <dgm:cxn modelId="{90844FF3-35AD-3844-9617-5C944BE9F8E0}" type="presOf" srcId="{1940AE72-4F72-4845-BA6F-73AEC80E09CD}" destId="{A036867B-F59A-714A-8B13-80D2EF93A155}" srcOrd="0" destOrd="0" presId="urn:microsoft.com/office/officeart/2005/8/layout/hProcess4"/>
+    <dgm:cxn modelId="{84D7573F-D29D-A146-BE55-B81F8C1C2D06}" type="presOf" srcId="{F4DD572C-71D0-0145-86B3-19D40DE231F6}" destId="{61E7ADA9-8BE6-3544-8CFC-C4E0092B71C2}" srcOrd="1" destOrd="1" presId="urn:microsoft.com/office/officeart/2005/8/layout/hProcess4"/>
+    <dgm:cxn modelId="{9F373FDF-18E8-2E46-86E6-C21811958C75}" srcId="{43B25A67-922A-2041-AA3C-F8C6CB55B4E0}" destId="{16C5F9F7-2F78-C94D-8508-0E70E8564E29}" srcOrd="1" destOrd="0" parTransId="{AE5BFECE-5F47-5C4A-BD01-8772160BCC6A}" sibTransId="{85FC7102-AE5F-F442-B658-2FB5C27534A5}"/>
+    <dgm:cxn modelId="{791B21FD-5B8C-B34D-B0C4-3202B52F2E6F}" type="presOf" srcId="{945F5DC5-A236-CD46-A614-B22DA4099DEB}" destId="{7509BC23-1756-F343-BDB3-B8718AF3537C}" srcOrd="1" destOrd="0" presId="urn:microsoft.com/office/officeart/2005/8/layout/hProcess4"/>
+    <dgm:cxn modelId="{A7EC0B6E-AF96-9B47-8B9A-B3AD3138D559}" srcId="{406E52C0-C70C-BE4D-8253-3096C307D87B}" destId="{945F5DC5-A236-CD46-A614-B22DA4099DEB}" srcOrd="0" destOrd="0" parTransId="{802CA7C1-5425-514B-9E31-757EE77E88E1}" sibTransId="{4A607509-3E78-F94D-BD92-530048E41155}"/>
+    <dgm:cxn modelId="{AFD7CC02-691E-F74F-B05A-E34F25D42CC6}" srcId="{51B83B0F-3F8C-5C40-A2BE-5E68971439AD}" destId="{F4AAB694-F90C-F34E-B8EC-3014E3A331C0}" srcOrd="3" destOrd="0" parTransId="{2ABB75C2-09BE-2442-BDEA-DC6BE67C09EA}" sibTransId="{2D707F23-1622-994A-B093-2799D10B056C}"/>
+    <dgm:cxn modelId="{86331821-57B5-F348-AB1A-0BDF9BF067FC}" type="presOf" srcId="{BD88C4C1-BF5B-9B43-B79F-EE249F95A5D8}" destId="{B93AAE61-D6DA-6342-BF21-C91999009117}" srcOrd="0" destOrd="0" presId="urn:microsoft.com/office/officeart/2005/8/layout/hProcess4"/>
+    <dgm:cxn modelId="{655F972F-3C5A-5948-AB5F-C21DAB004DF8}" type="presOf" srcId="{406E52C0-C70C-BE4D-8253-3096C307D87B}" destId="{B06D2827-A2B5-744A-870E-5C5B8B05705B}" srcOrd="0" destOrd="0" presId="urn:microsoft.com/office/officeart/2005/8/layout/hProcess4"/>
+    <dgm:cxn modelId="{779452F9-4E04-8744-8FBE-B9FF47B18D3B}" type="presOf" srcId="{3B2A067C-7E16-4245-ABE0-2CFE5012049B}" destId="{393E94F3-8C4E-1541-B763-D74D739896C2}" srcOrd="0" destOrd="0" presId="urn:microsoft.com/office/officeart/2005/8/layout/hProcess4"/>
+    <dgm:cxn modelId="{F70590B1-C46C-F64D-9820-37605BA77565}" type="presOf" srcId="{945F5DC5-A236-CD46-A614-B22DA4099DEB}" destId="{ABD3ECA2-C9C6-EB46-9C23-C0E532FF6524}" srcOrd="0" destOrd="0" presId="urn:microsoft.com/office/officeart/2005/8/layout/hProcess4"/>
+    <dgm:cxn modelId="{3A4A0F09-E4CD-1D47-A846-1F0E7EC46379}" type="presOf" srcId="{16C5F9F7-2F78-C94D-8508-0E70E8564E29}" destId="{95548B97-43B0-B04C-9763-3D8BD348FE4A}" srcOrd="1" destOrd="1" presId="urn:microsoft.com/office/officeart/2005/8/layout/hProcess4"/>
+    <dgm:cxn modelId="{195FD793-02DC-D14C-8E2E-130216291899}" type="presOf" srcId="{55622261-26B7-1846-B351-0409313808C4}" destId="{95548B97-43B0-B04C-9763-3D8BD348FE4A}" srcOrd="1" destOrd="0" presId="urn:microsoft.com/office/officeart/2005/8/layout/hProcess4"/>
+    <dgm:cxn modelId="{AE2455B9-E619-8E41-A2CF-ADC3AC0A59DB}" type="presOf" srcId="{51B83B0F-3F8C-5C40-A2BE-5E68971439AD}" destId="{79BC6410-F146-D642-AD40-01349F353043}" srcOrd="0" destOrd="0" presId="urn:microsoft.com/office/officeart/2005/8/layout/hProcess4"/>
+    <dgm:cxn modelId="{DF66E7AB-0DBB-3A48-A4EB-32079318090D}" type="presOf" srcId="{F4AAB694-F90C-F34E-B8EC-3014E3A331C0}" destId="{F53E7255-6345-CD43-83E4-DC97D281E1CC}" srcOrd="0" destOrd="0" presId="urn:microsoft.com/office/officeart/2005/8/layout/hProcess4"/>
+    <dgm:cxn modelId="{94446D00-AFAD-0D45-BD6C-49CF373662BD}" srcId="{43B25A67-922A-2041-AA3C-F8C6CB55B4E0}" destId="{55622261-26B7-1846-B351-0409313808C4}" srcOrd="0" destOrd="0" parTransId="{42C8CD77-7F71-2746-9C70-ABC60ED040A9}" sibTransId="{4B162053-2CD0-9F44-BBAB-108FDBDEF6D7}"/>
+    <dgm:cxn modelId="{423232F8-D84A-B647-A8E5-847CBBE6F151}" type="presOf" srcId="{5D9183F3-6DD7-8D4D-9F55-73D2D5457884}" destId="{BB09D893-BEAE-DF49-88B8-D4C2CFAC2287}" srcOrd="0" destOrd="1" presId="urn:microsoft.com/office/officeart/2005/8/layout/hProcess4"/>
     <dgm:cxn modelId="{514B5BAD-C834-CB44-89B6-7BBC867D4D40}" srcId="{1940AE72-4F72-4845-BA6F-73AEC80E09CD}" destId="{5D9183F3-6DD7-8D4D-9F55-73D2D5457884}" srcOrd="1" destOrd="0" parTransId="{7222531B-C587-6442-9CEB-9FF99EC65016}" sibTransId="{CEF09675-5BB0-274E-AC33-DBF3C76DAE96}"/>
-    <dgm:cxn modelId="{1611DD28-AD2F-F94C-908E-138E32FB4391}" type="presOf" srcId="{43B25A67-922A-2041-AA3C-F8C6CB55B4E0}" destId="{79524DD6-4A31-2549-89BE-16FD1F96B4BC}" srcOrd="0" destOrd="0" presId="urn:microsoft.com/office/officeart/2005/8/layout/hProcess4"/>
-    <dgm:cxn modelId="{CF311D68-C395-B946-B42E-5BCF159C2D49}" type="presOf" srcId="{5D9183F3-6DD7-8D4D-9F55-73D2D5457884}" destId="{42E3F9A2-D63C-9C4B-9BC1-6CE52CE90DDD}" srcOrd="1" destOrd="1" presId="urn:microsoft.com/office/officeart/2005/8/layout/hProcess4"/>
-    <dgm:cxn modelId="{BF529209-D843-E146-9EF7-BFABC7CF5CF8}" type="presOf" srcId="{F4DD572C-71D0-0145-86B3-19D40DE231F6}" destId="{B93AAE61-D6DA-6342-BF21-C91999009117}" srcOrd="0" destOrd="1" presId="urn:microsoft.com/office/officeart/2005/8/layout/hProcess4"/>
-    <dgm:cxn modelId="{14B57B7C-AED0-9744-9F1E-1DEEE1F9F35A}" type="presOf" srcId="{55622261-26B7-1846-B351-0409313808C4}" destId="{B736C658-477B-D043-8CDC-403671EE7D44}" srcOrd="0" destOrd="0" presId="urn:microsoft.com/office/officeart/2005/8/layout/hProcess4"/>
-    <dgm:cxn modelId="{1E6F7CE2-504F-2842-8240-D7AA7212942A}" srcId="{F4AAB694-F90C-F34E-B8EC-3014E3A331C0}" destId="{BD88C4C1-BF5B-9B43-B79F-EE249F95A5D8}" srcOrd="0" destOrd="0" parTransId="{38ECD1B8-F84A-F54F-A7F0-CB5F58A93933}" sibTransId="{21D611DC-C4F8-6B44-AFA4-9700C74C7CB5}"/>
-    <dgm:cxn modelId="{AE2455B9-E619-8E41-A2CF-ADC3AC0A59DB}" type="presOf" srcId="{51B83B0F-3F8C-5C40-A2BE-5E68971439AD}" destId="{79BC6410-F146-D642-AD40-01349F353043}" srcOrd="0" destOrd="0" presId="urn:microsoft.com/office/officeart/2005/8/layout/hProcess4"/>
-    <dgm:cxn modelId="{A7EC0B6E-AF96-9B47-8B9A-B3AD3138D559}" srcId="{406E52C0-C70C-BE4D-8253-3096C307D87B}" destId="{945F5DC5-A236-CD46-A614-B22DA4099DEB}" srcOrd="0" destOrd="0" parTransId="{802CA7C1-5425-514B-9E31-757EE77E88E1}" sibTransId="{4A607509-3E78-F94D-BD92-530048E41155}"/>
-    <dgm:cxn modelId="{40A2E82C-92A9-5345-BD85-742401BE6164}" type="presOf" srcId="{7876F7AB-81C6-CF44-AA9E-B306B3FD66AF}" destId="{BB09D893-BEAE-DF49-88B8-D4C2CFAC2287}" srcOrd="0" destOrd="0" presId="urn:microsoft.com/office/officeart/2005/8/layout/hProcess4"/>
-    <dgm:cxn modelId="{F70590B1-C46C-F64D-9820-37605BA77565}" type="presOf" srcId="{945F5DC5-A236-CD46-A614-B22DA4099DEB}" destId="{ABD3ECA2-C9C6-EB46-9C23-C0E532FF6524}" srcOrd="0" destOrd="0" presId="urn:microsoft.com/office/officeart/2005/8/layout/hProcess4"/>
-    <dgm:cxn modelId="{5F9FFC6C-19A0-CB43-AB10-2C0ECCA24DFC}" type="presOf" srcId="{1FA5CE13-B0DC-7A46-B1D1-1AA705D61694}" destId="{ABD3ECA2-C9C6-EB46-9C23-C0E532FF6524}" srcOrd="0" destOrd="1" presId="urn:microsoft.com/office/officeart/2005/8/layout/hProcess4"/>
-    <dgm:cxn modelId="{779452F9-4E04-8744-8FBE-B9FF47B18D3B}" type="presOf" srcId="{3B2A067C-7E16-4245-ABE0-2CFE5012049B}" destId="{393E94F3-8C4E-1541-B763-D74D739896C2}" srcOrd="0" destOrd="0" presId="urn:microsoft.com/office/officeart/2005/8/layout/hProcess4"/>
-    <dgm:cxn modelId="{94446D00-AFAD-0D45-BD6C-49CF373662BD}" srcId="{43B25A67-922A-2041-AA3C-F8C6CB55B4E0}" destId="{55622261-26B7-1846-B351-0409313808C4}" srcOrd="0" destOrd="0" parTransId="{42C8CD77-7F71-2746-9C70-ABC60ED040A9}" sibTransId="{4B162053-2CD0-9F44-BBAB-108FDBDEF6D7}"/>
     <dgm:cxn modelId="{D7719C8F-7768-8648-95D4-8B7695CEDEA0}" srcId="{406E52C0-C70C-BE4D-8253-3096C307D87B}" destId="{1FA5CE13-B0DC-7A46-B1D1-1AA705D61694}" srcOrd="1" destOrd="0" parTransId="{6A610E3C-8B12-624C-9081-A2D1EE0E94F7}" sibTransId="{CDA055E2-EA68-4049-A4EE-9C65192C38F6}"/>
-    <dgm:cxn modelId="{DF66E7AB-0DBB-3A48-A4EB-32079318090D}" type="presOf" srcId="{F4AAB694-F90C-F34E-B8EC-3014E3A331C0}" destId="{F53E7255-6345-CD43-83E4-DC97D281E1CC}" srcOrd="0" destOrd="0" presId="urn:microsoft.com/office/officeart/2005/8/layout/hProcess4"/>
-    <dgm:cxn modelId="{40DF8889-F39C-6445-86DA-D9A284BD8624}" srcId="{F4AAB694-F90C-F34E-B8EC-3014E3A331C0}" destId="{F4DD572C-71D0-0145-86B3-19D40DE231F6}" srcOrd="1" destOrd="0" parTransId="{A9631989-F397-C940-9912-44AAD40FB609}" sibTransId="{A5046C3D-6435-2A4C-B88D-6BD9FFC52EEB}"/>
-    <dgm:cxn modelId="{195FD793-02DC-D14C-8E2E-130216291899}" type="presOf" srcId="{55622261-26B7-1846-B351-0409313808C4}" destId="{95548B97-43B0-B04C-9763-3D8BD348FE4A}" srcOrd="1" destOrd="0" presId="urn:microsoft.com/office/officeart/2005/8/layout/hProcess4"/>
-    <dgm:cxn modelId="{F5E7F244-6CB1-8D46-BEE4-23F15B47D0B6}" type="presOf" srcId="{BD88C4C1-BF5B-9B43-B79F-EE249F95A5D8}" destId="{61E7ADA9-8BE6-3544-8CFC-C4E0092B71C2}" srcOrd="1" destOrd="0" presId="urn:microsoft.com/office/officeart/2005/8/layout/hProcess4"/>
-    <dgm:cxn modelId="{37B002B5-3CDE-CF44-9BB3-92A9B79FBE48}" srcId="{51B83B0F-3F8C-5C40-A2BE-5E68971439AD}" destId="{406E52C0-C70C-BE4D-8253-3096C307D87B}" srcOrd="2" destOrd="0" parTransId="{367BF942-1657-4742-A19C-9B1C92911E21}" sibTransId="{03C3A97C-7F74-AA41-85C4-8204BE425A63}"/>
-    <dgm:cxn modelId="{90844FF3-35AD-3844-9617-5C944BE9F8E0}" type="presOf" srcId="{1940AE72-4F72-4845-BA6F-73AEC80E09CD}" destId="{A036867B-F59A-714A-8B13-80D2EF93A155}" srcOrd="0" destOrd="0" presId="urn:microsoft.com/office/officeart/2005/8/layout/hProcess4"/>
-    <dgm:cxn modelId="{791B21FD-5B8C-B34D-B0C4-3202B52F2E6F}" type="presOf" srcId="{945F5DC5-A236-CD46-A614-B22DA4099DEB}" destId="{7509BC23-1756-F343-BDB3-B8718AF3537C}" srcOrd="1" destOrd="0" presId="urn:microsoft.com/office/officeart/2005/8/layout/hProcess4"/>
-    <dgm:cxn modelId="{9E66E1FB-4E8A-8B4E-81BC-7894DD124EAD}" type="presOf" srcId="{7876F7AB-81C6-CF44-AA9E-B306B3FD66AF}" destId="{42E3F9A2-D63C-9C4B-9BC1-6CE52CE90DDD}" srcOrd="1" destOrd="0" presId="urn:microsoft.com/office/officeart/2005/8/layout/hProcess4"/>
-    <dgm:cxn modelId="{86331821-57B5-F348-AB1A-0BDF9BF067FC}" type="presOf" srcId="{BD88C4C1-BF5B-9B43-B79F-EE249F95A5D8}" destId="{B93AAE61-D6DA-6342-BF21-C91999009117}" srcOrd="0" destOrd="0" presId="urn:microsoft.com/office/officeart/2005/8/layout/hProcess4"/>
-    <dgm:cxn modelId="{423232F8-D84A-B647-A8E5-847CBBE6F151}" type="presOf" srcId="{5D9183F3-6DD7-8D4D-9F55-73D2D5457884}" destId="{BB09D893-BEAE-DF49-88B8-D4C2CFAC2287}" srcOrd="0" destOrd="1" presId="urn:microsoft.com/office/officeart/2005/8/layout/hProcess4"/>
-    <dgm:cxn modelId="{EB9E81AC-81E4-A243-8F6D-90122A3A9BEB}" srcId="{51B83B0F-3F8C-5C40-A2BE-5E68971439AD}" destId="{1940AE72-4F72-4845-BA6F-73AEC80E09CD}" srcOrd="1" destOrd="0" parTransId="{2F5BA100-CB2B-C744-B1BF-2D3F4962731F}" sibTransId="{AEF22083-608A-7A46-8BEE-986AA5389EF2}"/>
-    <dgm:cxn modelId="{2297A67A-6D79-2F4A-8D8E-221DD1E9F6CB}" type="presOf" srcId="{AEF22083-608A-7A46-8BEE-986AA5389EF2}" destId="{8538C183-8AFF-594A-9CBC-7403B42DFDD3}" srcOrd="0" destOrd="0" presId="urn:microsoft.com/office/officeart/2005/8/layout/hProcess4"/>
-    <dgm:cxn modelId="{1DF64485-5459-7A44-96AC-CAA64E644AC3}" srcId="{1940AE72-4F72-4845-BA6F-73AEC80E09CD}" destId="{7876F7AB-81C6-CF44-AA9E-B306B3FD66AF}" srcOrd="0" destOrd="0" parTransId="{DAE7D269-70C5-8E4D-A959-9C32BF672A01}" sibTransId="{84C9F3F7-C9A6-3B4B-8EB4-CE6A67E71EA5}"/>
-    <dgm:cxn modelId="{AFD7CC02-691E-F74F-B05A-E34F25D42CC6}" srcId="{51B83B0F-3F8C-5C40-A2BE-5E68971439AD}" destId="{F4AAB694-F90C-F34E-B8EC-3014E3A331C0}" srcOrd="3" destOrd="0" parTransId="{2ABB75C2-09BE-2442-BDEA-DC6BE67C09EA}" sibTransId="{2D707F23-1622-994A-B093-2799D10B056C}"/>
-    <dgm:cxn modelId="{70A8FE90-25A1-CC42-B521-891A90721C69}" type="presOf" srcId="{03C3A97C-7F74-AA41-85C4-8204BE425A63}" destId="{280A4BBC-765D-D947-907A-D93B23586433}" srcOrd="0" destOrd="0" presId="urn:microsoft.com/office/officeart/2005/8/layout/hProcess4"/>
-    <dgm:cxn modelId="{3A4A0F09-E4CD-1D47-A846-1F0E7EC46379}" type="presOf" srcId="{16C5F9F7-2F78-C94D-8508-0E70E8564E29}" destId="{95548B97-43B0-B04C-9763-3D8BD348FE4A}" srcOrd="1" destOrd="1" presId="urn:microsoft.com/office/officeart/2005/8/layout/hProcess4"/>
-    <dgm:cxn modelId="{91989CCD-5E71-9A44-9877-080B8BA04DE2}" type="presOf" srcId="{16C5F9F7-2F78-C94D-8508-0E70E8564E29}" destId="{B736C658-477B-D043-8CDC-403671EE7D44}" srcOrd="0" destOrd="1" presId="urn:microsoft.com/office/officeart/2005/8/layout/hProcess4"/>
-    <dgm:cxn modelId="{84D7573F-D29D-A146-BE55-B81F8C1C2D06}" type="presOf" srcId="{F4DD572C-71D0-0145-86B3-19D40DE231F6}" destId="{61E7ADA9-8BE6-3544-8CFC-C4E0092B71C2}" srcOrd="1" destOrd="1" presId="urn:microsoft.com/office/officeart/2005/8/layout/hProcess4"/>
-    <dgm:cxn modelId="{655F972F-3C5A-5948-AB5F-C21DAB004DF8}" type="presOf" srcId="{406E52C0-C70C-BE4D-8253-3096C307D87B}" destId="{B06D2827-A2B5-744A-870E-5C5B8B05705B}" srcOrd="0" destOrd="0" presId="urn:microsoft.com/office/officeart/2005/8/layout/hProcess4"/>
-    <dgm:cxn modelId="{8905941E-2FCC-A14A-8269-D2E222C7EED9}" type="presOf" srcId="{1FA5CE13-B0DC-7A46-B1D1-1AA705D61694}" destId="{7509BC23-1756-F343-BDB3-B8718AF3537C}" srcOrd="1" destOrd="1" presId="urn:microsoft.com/office/officeart/2005/8/layout/hProcess4"/>
-    <dgm:cxn modelId="{9F373FDF-18E8-2E46-86E6-C21811958C75}" srcId="{43B25A67-922A-2041-AA3C-F8C6CB55B4E0}" destId="{16C5F9F7-2F78-C94D-8508-0E70E8564E29}" srcOrd="1" destOrd="0" parTransId="{AE5BFECE-5F47-5C4A-BD01-8772160BCC6A}" sibTransId="{85FC7102-AE5F-F442-B658-2FB5C27534A5}"/>
-    <dgm:cxn modelId="{E7B07684-4AEB-9547-A34A-33CB47C84024}" srcId="{51B83B0F-3F8C-5C40-A2BE-5E68971439AD}" destId="{43B25A67-922A-2041-AA3C-F8C6CB55B4E0}" srcOrd="0" destOrd="0" parTransId="{3416ED5C-1936-8E42-96D2-EBADC6BD3947}" sibTransId="{3B2A067C-7E16-4245-ABE0-2CFE5012049B}"/>
     <dgm:cxn modelId="{908334DD-029B-ED4D-A4AF-6E47279C804E}" type="presParOf" srcId="{79BC6410-F146-D642-AD40-01349F353043}" destId="{E3198660-6672-C344-B382-4E3A9131ED7C}" srcOrd="0" destOrd="0" presId="urn:microsoft.com/office/officeart/2005/8/layout/hProcess4"/>
     <dgm:cxn modelId="{5E580CA5-C441-FC41-B4F4-2C9770A489D9}" type="presParOf" srcId="{79BC6410-F146-D642-AD40-01349F353043}" destId="{794B96EE-1896-D847-A679-63FD918CD707}" srcOrd="1" destOrd="0" presId="urn:microsoft.com/office/officeart/2005/8/layout/hProcess4"/>
     <dgm:cxn modelId="{4A24DA08-3799-4846-939A-3C6138DEC5B8}" type="presParOf" srcId="{79BC6410-F146-D642-AD40-01349F353043}" destId="{141A3443-EBA3-7448-B3EB-15B6E5685FC4}" srcOrd="2" destOrd="0" presId="urn:microsoft.com/office/officeart/2005/8/layout/hProcess4"/>
@@ -30424,7 +30430,7 @@
           <a:p>
             <a:fld id="{724506C0-3FFE-45A5-803D-9F4FC5464A70}" type="datetimeFigureOut">
               <a:rPr lang="en-US" smtClean="0"/>
-              <a:t>10/27/15</a:t>
+              <a:t>11/1/15</a:t>
             </a:fld>
             <a:endParaRPr lang="en-US"/>
           </a:p>
@@ -31185,7 +31191,7 @@
             <a:fld id="{5E0C3846-8D4C-4326-8BC7-9B455A036298}" type="slidenum">
               <a:rPr lang="en-US" smtClean="0"/>
               <a:pPr/>
-              <a:t>19</a:t>
+              <a:t>22</a:t>
             </a:fld>
             <a:endParaRPr lang="en-US"/>
           </a:p>
@@ -31293,7 +31299,7 @@
             <a:fld id="{5E0C3846-8D4C-4326-8BC7-9B455A036298}" type="slidenum">
               <a:rPr lang="en-US" smtClean="0"/>
               <a:pPr/>
-              <a:t>20</a:t>
+              <a:t>23</a:t>
             </a:fld>
             <a:endParaRPr lang="en-US"/>
           </a:p>
@@ -31375,7 +31381,7 @@
             <a:fld id="{5E0C3846-8D4C-4326-8BC7-9B455A036298}" type="slidenum">
               <a:rPr lang="en-US" smtClean="0"/>
               <a:pPr/>
-              <a:t>21</a:t>
+              <a:t>24</a:t>
             </a:fld>
             <a:endParaRPr lang="en-US"/>
           </a:p>
@@ -31660,7 +31666,7 @@
             <a:fld id="{5E0C3846-8D4C-4326-8BC7-9B455A036298}" type="slidenum">
               <a:rPr lang="en-US" smtClean="0"/>
               <a:pPr/>
-              <a:t>5</a:t>
+              <a:t>8</a:t>
             </a:fld>
             <a:endParaRPr lang="en-US"/>
           </a:p>
@@ -31773,7 +31779,7 @@
             <a:fld id="{5E0C3846-8D4C-4326-8BC7-9B455A036298}" type="slidenum">
               <a:rPr lang="en-US" smtClean="0"/>
               <a:pPr/>
-              <a:t>7</a:t>
+              <a:t>10</a:t>
             </a:fld>
             <a:endParaRPr lang="en-US"/>
           </a:p>
@@ -31852,18 +31858,7 @@
                 <a:ea typeface="+mn-ea"/>
                 <a:cs typeface="+mn-cs"/>
               </a:rPr>
-              <a:t>ITAR (International Traffic in Arms Regulations) and the EAR (Export Administration Regulations) are export control regulations run by different departments of the US Government.  Both of them are designed to help ensure that defense related technology does not get </a:t>
-            </a:r>
-            <a:r>
-              <a:rPr lang="en-US" sz="1200" kern="1200" dirty="0" smtClean="0">
-                <a:solidFill>
-                  <a:schemeClr val="tx1"/>
-                </a:solidFill>
-                <a:latin typeface="+mn-lt"/>
-                <a:ea typeface="+mn-ea"/>
-                <a:cs typeface="+mn-cs"/>
-              </a:rPr>
-              <a:t>into the wrong hands. Satellites</a:t>
+              <a:t>ITAR (International Traffic in Arms Regulations) and the EAR (Export Administration Regulations) are export control regulations run by different departments of the US Government.  Both of them are designed to help ensure that defense related technology does not get into the wrong hands. Satellites</a:t>
             </a:r>
             <a:r>
               <a:rPr lang="en-US" sz="1200" kern="1200" baseline="0" dirty="0" smtClean="0">
@@ -31898,7 +31893,7 @@
             <a:fld id="{5E0C3846-8D4C-4326-8BC7-9B455A036298}" type="slidenum">
               <a:rPr lang="en-US" smtClean="0"/>
               <a:pPr/>
-              <a:t>8</a:t>
+              <a:t>11</a:t>
             </a:fld>
             <a:endParaRPr lang="en-US"/>
           </a:p>
@@ -31991,7 +31986,7 @@
           <a:p>
             <a:fld id="{F8646707-6BBD-41A9-B4DF-0C76A73A2D2A}" type="slidenum">
               <a:rPr lang="en-US" smtClean="0"/>
-              <a:t>9</a:t>
+              <a:t>12</a:t>
             </a:fld>
             <a:endParaRPr lang="en-US"/>
           </a:p>
@@ -32075,7 +32070,7 @@
           <a:p>
             <a:fld id="{F8646707-6BBD-41A9-B4DF-0C76A73A2D2A}" type="slidenum">
               <a:rPr lang="en-US" smtClean="0"/>
-              <a:t>10</a:t>
+              <a:t>13</a:t>
             </a:fld>
             <a:endParaRPr lang="en-US"/>
           </a:p>
@@ -32190,7 +32185,7 @@
             <a:fld id="{5E0C3846-8D4C-4326-8BC7-9B455A036298}" type="slidenum">
               <a:rPr lang="en-US" smtClean="0"/>
               <a:pPr/>
-              <a:t>16</a:t>
+              <a:t>19</a:t>
             </a:fld>
             <a:endParaRPr lang="en-US"/>
           </a:p>
@@ -32539,7 +32534,7 @@
           <a:p>
             <a:fld id="{F922158D-428B-4987-8B28-745A2AFA1252}" type="datetimeFigureOut">
               <a:rPr lang="en-US" smtClean="0"/>
-              <a:t>10/27/15</a:t>
+              <a:t>11/1/15</a:t>
             </a:fld>
             <a:endParaRPr lang="en-US"/>
           </a:p>
@@ -33132,7 +33127,7 @@
           <a:p>
             <a:fld id="{F922158D-428B-4987-8B28-745A2AFA1252}" type="datetimeFigureOut">
               <a:rPr lang="en-US" smtClean="0"/>
-              <a:t>10/27/15</a:t>
+              <a:t>11/1/15</a:t>
             </a:fld>
             <a:endParaRPr lang="en-US"/>
           </a:p>
@@ -33317,7 +33312,7 @@
           <a:p>
             <a:fld id="{F922158D-428B-4987-8B28-745A2AFA1252}" type="datetimeFigureOut">
               <a:rPr lang="en-US" smtClean="0"/>
-              <a:t>10/27/15</a:t>
+              <a:t>11/1/15</a:t>
             </a:fld>
             <a:endParaRPr lang="en-US"/>
           </a:p>
@@ -33633,7 +33628,7 @@
           <a:p>
             <a:fld id="{F922158D-428B-4987-8B28-745A2AFA1252}" type="datetimeFigureOut">
               <a:rPr lang="en-US" smtClean="0"/>
-              <a:t>10/27/15</a:t>
+              <a:t>11/1/15</a:t>
             </a:fld>
             <a:endParaRPr lang="en-US"/>
           </a:p>
@@ -34062,7 +34057,7 @@
           <a:p>
             <a:fld id="{F922158D-428B-4987-8B28-745A2AFA1252}" type="datetimeFigureOut">
               <a:rPr lang="en-US" smtClean="0"/>
-              <a:t>10/27/15</a:t>
+              <a:t>11/1/15</a:t>
             </a:fld>
             <a:endParaRPr lang="en-US"/>
           </a:p>
@@ -34359,7 +34354,7 @@
           <a:p>
             <a:fld id="{F922158D-428B-4987-8B28-745A2AFA1252}" type="datetimeFigureOut">
               <a:rPr lang="en-US" smtClean="0"/>
-              <a:t>10/27/15</a:t>
+              <a:t>11/1/15</a:t>
             </a:fld>
             <a:endParaRPr lang="en-US"/>
           </a:p>
@@ -34799,7 +34794,7 @@
           <a:p>
             <a:fld id="{F922158D-428B-4987-8B28-745A2AFA1252}" type="datetimeFigureOut">
               <a:rPr lang="en-US" smtClean="0"/>
-              <a:t>10/27/15</a:t>
+              <a:t>11/1/15</a:t>
             </a:fld>
             <a:endParaRPr lang="en-US"/>
           </a:p>
@@ -34928,7 +34923,7 @@
           <a:p>
             <a:fld id="{F922158D-428B-4987-8B28-745A2AFA1252}" type="datetimeFigureOut">
               <a:rPr lang="en-US" smtClean="0"/>
-              <a:t>10/27/15</a:t>
+              <a:t>11/1/15</a:t>
             </a:fld>
             <a:endParaRPr lang="en-US"/>
           </a:p>
@@ -35028,7 +35023,7 @@
           <a:p>
             <a:fld id="{F922158D-428B-4987-8B28-745A2AFA1252}" type="datetimeFigureOut">
               <a:rPr lang="en-US" smtClean="0"/>
-              <a:t>10/27/15</a:t>
+              <a:t>11/1/15</a:t>
             </a:fld>
             <a:endParaRPr lang="en-US"/>
           </a:p>
@@ -35312,7 +35307,7 @@
           <a:p>
             <a:fld id="{F922158D-428B-4987-8B28-745A2AFA1252}" type="datetimeFigureOut">
               <a:rPr lang="en-US" smtClean="0"/>
-              <a:t>10/27/15</a:t>
+              <a:t>11/1/15</a:t>
             </a:fld>
             <a:endParaRPr lang="en-US"/>
           </a:p>
@@ -35574,7 +35569,7 @@
           <a:p>
             <a:fld id="{F922158D-428B-4987-8B28-745A2AFA1252}" type="datetimeFigureOut">
               <a:rPr lang="en-US" smtClean="0"/>
-              <a:t>10/27/15</a:t>
+              <a:t>11/1/15</a:t>
             </a:fld>
             <a:endParaRPr lang="en-US"/>
           </a:p>
@@ -35792,7 +35787,7 @@
           <a:p>
             <a:fld id="{F922158D-428B-4987-8B28-745A2AFA1252}" type="datetimeFigureOut">
               <a:rPr lang="en-US" smtClean="0"/>
-              <a:t>10/27/15</a:t>
+              <a:t>11/1/15</a:t>
             </a:fld>
             <a:endParaRPr lang="en-US"/>
           </a:p>
@@ -36364,6 +36359,548 @@
       </p:grpSpPr>
       <p:sp>
         <p:nvSpPr>
+          <p:cNvPr id="2" name="Title 1"/>
+          <p:cNvSpPr>
+            <a:spLocks noGrp="1"/>
+          </p:cNvSpPr>
+          <p:nvPr>
+            <p:ph type="title"/>
+            <p:custDataLst>
+              <p:tags r:id="rId2"/>
+            </p:custDataLst>
+          </p:nvPr>
+        </p:nvSpPr>
+        <p:spPr>
+          <a:xfrm>
+            <a:off x="457200" y="685800"/>
+            <a:ext cx="8229600" cy="914400"/>
+          </a:xfrm>
+        </p:spPr>
+        <p:txBody>
+          <a:bodyPr/>
+          <a:lstStyle/>
+          <a:p>
+            <a:r>
+              <a:rPr lang="en-US" dirty="0" smtClean="0"/>
+              <a:t>Current Status</a:t>
+            </a:r>
+            <a:endParaRPr lang="en-US" dirty="0"/>
+          </a:p>
+        </p:txBody>
+      </p:sp>
+      <p:sp>
+        <p:nvSpPr>
+          <p:cNvPr id="4" name="Content Placeholder 3"/>
+          <p:cNvSpPr>
+            <a:spLocks noGrp="1"/>
+          </p:cNvSpPr>
+          <p:nvPr>
+            <p:ph idx="1"/>
+          </p:nvPr>
+        </p:nvSpPr>
+        <p:spPr>
+          <a:xfrm>
+            <a:off x="381000" y="1295400"/>
+            <a:ext cx="8458200" cy="5029200"/>
+          </a:xfrm>
+        </p:spPr>
+        <p:txBody>
+          <a:bodyPr/>
+          <a:lstStyle/>
+          <a:p>
+            <a:pPr>
+              <a:lnSpc>
+                <a:spcPct val="150000"/>
+              </a:lnSpc>
+            </a:pPr>
+            <a:r>
+              <a:rPr lang="en-US" dirty="0" smtClean="0"/>
+              <a:t>We have a growing team of 40 volunteers/employees </a:t>
+            </a:r>
+          </a:p>
+          <a:p>
+            <a:pPr>
+              <a:lnSpc>
+                <a:spcPct val="150000"/>
+              </a:lnSpc>
+            </a:pPr>
+            <a:r>
+              <a:rPr lang="en-US" dirty="0" smtClean="0"/>
+              <a:t>A $100,000+ rideshare payload study at MSS is underway</a:t>
+            </a:r>
+            <a:endParaRPr lang="en-US" dirty="0"/>
+          </a:p>
+          <a:p>
+            <a:pPr>
+              <a:lnSpc>
+                <a:spcPct val="150000"/>
+              </a:lnSpc>
+            </a:pPr>
+            <a:r>
+              <a:rPr lang="en-US" dirty="0" smtClean="0"/>
+              <a:t>We are expecting a late 2016 or early 2017 launch</a:t>
+            </a:r>
+          </a:p>
+          <a:p>
+            <a:pPr>
+              <a:lnSpc>
+                <a:spcPct val="150000"/>
+              </a:lnSpc>
+            </a:pPr>
+            <a:r>
+              <a:rPr lang="en-US" dirty="0" smtClean="0"/>
+              <a:t>We will have 100 watts of power from the spacecraft</a:t>
+            </a:r>
+          </a:p>
+          <a:p>
+            <a:pPr>
+              <a:lnSpc>
+                <a:spcPct val="150000"/>
+              </a:lnSpc>
+            </a:pPr>
+            <a:r>
+              <a:rPr lang="en-US" dirty="0" smtClean="0"/>
+              <a:t>We will enjoy access to the </a:t>
+            </a:r>
+            <a:r>
+              <a:rPr lang="en-US" dirty="0" err="1" smtClean="0"/>
+              <a:t>coldplate</a:t>
+            </a:r>
+            <a:endParaRPr lang="en-US" dirty="0" smtClean="0"/>
+          </a:p>
+          <a:p>
+            <a:pPr>
+              <a:lnSpc>
+                <a:spcPct val="150000"/>
+              </a:lnSpc>
+            </a:pPr>
+            <a:r>
+              <a:rPr lang="en-US" dirty="0" smtClean="0"/>
+              <a:t>We can use several external areas on the spacecraft for antennas</a:t>
+            </a:r>
+          </a:p>
+          <a:p>
+            <a:pPr>
+              <a:lnSpc>
+                <a:spcPct val="150000"/>
+              </a:lnSpc>
+            </a:pPr>
+            <a:r>
+              <a:rPr lang="en-US" dirty="0" smtClean="0"/>
+              <a:t>We do </a:t>
+            </a:r>
+            <a:r>
+              <a:rPr lang="en-US" dirty="0" smtClean="0"/>
+              <a:t>not have to </a:t>
+            </a:r>
+            <a:r>
+              <a:rPr lang="en-US" dirty="0" smtClean="0"/>
+              <a:t>control the spacecraft</a:t>
+            </a:r>
+          </a:p>
+          <a:p>
+            <a:pPr>
+              <a:lnSpc>
+                <a:spcPct val="150000"/>
+              </a:lnSpc>
+            </a:pPr>
+            <a:r>
+              <a:rPr lang="en-US" dirty="0"/>
+              <a:t>G</a:t>
+            </a:r>
+            <a:r>
+              <a:rPr lang="en-US" dirty="0" smtClean="0"/>
+              <a:t>round station development is completely open source</a:t>
+            </a:r>
+          </a:p>
+          <a:p>
+            <a:pPr>
+              <a:lnSpc>
+                <a:spcPct val="150000"/>
+              </a:lnSpc>
+            </a:pPr>
+            <a:r>
+              <a:rPr lang="en-US" dirty="0" smtClean="0"/>
+              <a:t>Space segment development is ITAR controlled </a:t>
+            </a:r>
+          </a:p>
+        </p:txBody>
+      </p:sp>
+    </p:spTree>
+    <p:custDataLst>
+      <p:tags r:id="rId1"/>
+    </p:custDataLst>
+  </p:cSld>
+  <p:clrMapOvr>
+    <a:masterClrMapping/>
+  </p:clrMapOvr>
+  <p:transition xmlns:p14="http://schemas.microsoft.com/office/powerpoint/2010/main" spd="slow">
+    <p:fade/>
+  </p:transition>
+  <p:timing>
+    <p:tnLst>
+      <p:par>
+        <p:cTn xmlns:p14="http://schemas.microsoft.com/office/powerpoint/2010/main" id="1" dur="indefinite" restart="never" nodeType="tmRoot"/>
+      </p:par>
+    </p:tnLst>
+  </p:timing>
+</p:sld>
+</file>
+
+<file path=ppt/slides/slide11.xml><?xml version="1.0" encoding="utf-8"?>
+<p:sld xmlns:a="http://schemas.openxmlformats.org/drawingml/2006/main" xmlns:r="http://schemas.openxmlformats.org/officeDocument/2006/relationships" xmlns:p="http://schemas.openxmlformats.org/presentationml/2006/main">
+  <p:cSld>
+    <p:spTree>
+      <p:nvGrpSpPr>
+        <p:cNvPr id="1" name=""/>
+        <p:cNvGrpSpPr/>
+        <p:nvPr/>
+      </p:nvGrpSpPr>
+      <p:grpSpPr>
+        <a:xfrm>
+          <a:off x="0" y="0"/>
+          <a:ext cx="0" cy="0"/>
+          <a:chOff x="0" y="0"/>
+          <a:chExt cx="0" cy="0"/>
+        </a:xfrm>
+      </p:grpSpPr>
+      <p:sp>
+        <p:nvSpPr>
+          <p:cNvPr id="2" name="Title 1"/>
+          <p:cNvSpPr>
+            <a:spLocks noGrp="1"/>
+          </p:cNvSpPr>
+          <p:nvPr>
+            <p:ph type="title"/>
+          </p:nvPr>
+        </p:nvSpPr>
+        <p:spPr/>
+        <p:txBody>
+          <a:bodyPr/>
+          <a:lstStyle/>
+          <a:p>
+            <a:r>
+              <a:rPr lang="en-US" dirty="0" smtClean="0"/>
+              <a:t>Issues and Resolutions</a:t>
+            </a:r>
+            <a:endParaRPr lang="en-US" dirty="0"/>
+          </a:p>
+        </p:txBody>
+      </p:sp>
+      <p:sp>
+        <p:nvSpPr>
+          <p:cNvPr id="5" name="Content Placeholder 4"/>
+          <p:cNvSpPr>
+            <a:spLocks noGrp="1"/>
+          </p:cNvSpPr>
+          <p:nvPr>
+            <p:ph idx="1"/>
+          </p:nvPr>
+        </p:nvSpPr>
+        <p:spPr/>
+        <p:txBody>
+          <a:bodyPr>
+            <a:normAutofit fontScale="92500" lnSpcReduction="10000"/>
+          </a:bodyPr>
+          <a:lstStyle/>
+          <a:p>
+            <a:pPr>
+              <a:lnSpc>
+                <a:spcPct val="150000"/>
+              </a:lnSpc>
+            </a:pPr>
+            <a:r>
+              <a:rPr lang="en-US" dirty="0" smtClean="0"/>
+              <a:t>International Traffic in Arms Regulations directly affects this project</a:t>
+            </a:r>
+          </a:p>
+          <a:p>
+            <a:r>
+              <a:rPr lang="en-US" dirty="0"/>
+              <a:t>What and how did it impact the project?</a:t>
+            </a:r>
+          </a:p>
+          <a:p>
+            <a:pPr lvl="1"/>
+            <a:r>
+              <a:rPr lang="en-US" dirty="0"/>
+              <a:t>Time wasted, stress increased, harsh and unnecessary limits on human </a:t>
+            </a:r>
+            <a:r>
+              <a:rPr lang="en-US" dirty="0" smtClean="0"/>
+              <a:t>resources</a:t>
+            </a:r>
+          </a:p>
+          <a:p>
+            <a:pPr>
+              <a:lnSpc>
+                <a:spcPct val="150000"/>
+              </a:lnSpc>
+            </a:pPr>
+            <a:r>
+              <a:rPr lang="en-US" dirty="0" smtClean="0"/>
+              <a:t>Splitting up the project into </a:t>
+            </a:r>
+            <a:r>
+              <a:rPr lang="en-US" b="1" dirty="0" smtClean="0"/>
+              <a:t>Ground</a:t>
+            </a:r>
+            <a:r>
+              <a:rPr lang="en-US" dirty="0" smtClean="0"/>
+              <a:t> and </a:t>
+            </a:r>
+            <a:r>
+              <a:rPr lang="en-US" b="1" dirty="0"/>
+              <a:t>S</a:t>
+            </a:r>
+            <a:r>
+              <a:rPr lang="en-US" b="1" dirty="0" smtClean="0"/>
+              <a:t>pace</a:t>
+            </a:r>
+            <a:r>
+              <a:rPr lang="en-US" dirty="0" smtClean="0"/>
+              <a:t> allowed for open source development of the ground station while enabling the space segment development to continue to comply with ITAR. </a:t>
+            </a:r>
+          </a:p>
+          <a:p>
+            <a:pPr>
+              <a:lnSpc>
+                <a:spcPct val="150000"/>
+              </a:lnSpc>
+            </a:pPr>
+            <a:r>
+              <a:rPr lang="en-US" dirty="0" smtClean="0"/>
+              <a:t>Teams are now separate and communicate through the Air Interface Document, which defines the radio link between satellite and stations on the ground.</a:t>
+            </a:r>
+            <a:endParaRPr lang="en-US" dirty="0"/>
+          </a:p>
+        </p:txBody>
+      </p:sp>
+    </p:spTree>
+    <p:custDataLst>
+      <p:tags r:id="rId1"/>
+    </p:custDataLst>
+  </p:cSld>
+  <p:clrMapOvr>
+    <a:masterClrMapping/>
+  </p:clrMapOvr>
+  <p:transition xmlns:p14="http://schemas.microsoft.com/office/powerpoint/2010/main" spd="slow">
+    <p:fade/>
+  </p:transition>
+  <p:timing>
+    <p:tnLst>
+      <p:par>
+        <p:cTn xmlns:p14="http://schemas.microsoft.com/office/powerpoint/2010/main" id="1" dur="indefinite" restart="never" nodeType="tmRoot"/>
+      </p:par>
+    </p:tnLst>
+  </p:timing>
+</p:sld>
+</file>
+
+<file path=ppt/slides/slide12.xml><?xml version="1.0" encoding="utf-8"?>
+<p:sld xmlns:a="http://schemas.openxmlformats.org/drawingml/2006/main" xmlns:r="http://schemas.openxmlformats.org/officeDocument/2006/relationships" xmlns:p="http://schemas.openxmlformats.org/presentationml/2006/main">
+  <p:cSld>
+    <p:spTree>
+      <p:nvGrpSpPr>
+        <p:cNvPr id="1" name=""/>
+        <p:cNvGrpSpPr/>
+        <p:nvPr/>
+      </p:nvGrpSpPr>
+      <p:grpSpPr>
+        <a:xfrm>
+          <a:off x="0" y="0"/>
+          <a:ext cx="0" cy="0"/>
+          <a:chOff x="0" y="0"/>
+          <a:chExt cx="0" cy="0"/>
+        </a:xfrm>
+      </p:grpSpPr>
+      <p:sp>
+        <p:nvSpPr>
+          <p:cNvPr id="2" name="Title 1"/>
+          <p:cNvSpPr>
+            <a:spLocks noGrp="1"/>
+          </p:cNvSpPr>
+          <p:nvPr>
+            <p:ph type="title"/>
+          </p:nvPr>
+        </p:nvSpPr>
+        <p:spPr/>
+        <p:txBody>
+          <a:bodyPr/>
+          <a:lstStyle/>
+          <a:p>
+            <a:r>
+              <a:rPr lang="en-US" dirty="0" smtClean="0"/>
+              <a:t>Phase 4 Top-level Team Structure</a:t>
+            </a:r>
+            <a:endParaRPr lang="en-US" dirty="0"/>
+          </a:p>
+        </p:txBody>
+      </p:sp>
+      <p:graphicFrame>
+        <p:nvGraphicFramePr>
+          <p:cNvPr id="4" name="Content Placeholder 3"/>
+          <p:cNvGraphicFramePr>
+            <a:graphicFrameLocks noGrp="1"/>
+          </p:cNvGraphicFramePr>
+          <p:nvPr>
+            <p:ph idx="1"/>
+            <p:extLst>
+              <p:ext uri="{D42A27DB-BD31-4B8C-83A1-F6EECF244321}">
+                <p14:modId xmlns:p14="http://schemas.microsoft.com/office/powerpoint/2010/main" val="2475042945"/>
+              </p:ext>
+            </p:extLst>
+          </p:nvPr>
+        </p:nvGraphicFramePr>
+        <p:xfrm>
+          <a:off x="457200" y="1828800"/>
+          <a:ext cx="8229600" cy="4297363"/>
+        </p:xfrm>
+        <a:graphic>
+          <a:graphicData uri="http://schemas.openxmlformats.org/drawingml/2006/diagram">
+            <dgm:relIds xmlns:dgm="http://schemas.openxmlformats.org/drawingml/2006/diagram" xmlns:r="http://schemas.openxmlformats.org/officeDocument/2006/relationships" r:dm="rId3" r:lo="rId4" r:qs="rId5" r:cs="rId6"/>
+          </a:graphicData>
+        </a:graphic>
+      </p:graphicFrame>
+      <p:pic>
+        <p:nvPicPr>
+          <p:cNvPr id="5" name="Picture 4" descr="12015062_10153001489786883_1121530478985270090_o.jpg"/>
+          <p:cNvPicPr>
+            <a:picLocks noChangeAspect="1"/>
+          </p:cNvPicPr>
+          <p:nvPr/>
+        </p:nvPicPr>
+        <p:blipFill>
+          <a:blip r:embed="rId8">
+            <a:extLst>
+              <a:ext uri="{28A0092B-C50C-407E-A947-70E740481C1C}">
+                <a14:useLocalDpi xmlns:a14="http://schemas.microsoft.com/office/drawing/2010/main" val="0"/>
+              </a:ext>
+            </a:extLst>
+          </a:blip>
+          <a:stretch>
+            <a:fillRect/>
+          </a:stretch>
+        </p:blipFill>
+        <p:spPr>
+          <a:xfrm>
+            <a:off x="304800" y="3810000"/>
+            <a:ext cx="4191000" cy="2357438"/>
+          </a:xfrm>
+          <a:prstGeom prst="rect">
+            <a:avLst/>
+          </a:prstGeom>
+        </p:spPr>
+      </p:pic>
+      <p:pic>
+        <p:nvPicPr>
+          <p:cNvPr id="6" name="Picture 5" descr="GitHub-Mark.png"/>
+          <p:cNvPicPr>
+            <a:picLocks noChangeAspect="1"/>
+          </p:cNvPicPr>
+          <p:nvPr/>
+        </p:nvPicPr>
+        <p:blipFill>
+          <a:blip r:embed="rId9">
+            <a:extLst>
+              <a:ext uri="{28A0092B-C50C-407E-A947-70E740481C1C}">
+                <a14:useLocalDpi xmlns:a14="http://schemas.microsoft.com/office/drawing/2010/main" val="0"/>
+              </a:ext>
+            </a:extLst>
+          </a:blip>
+          <a:stretch>
+            <a:fillRect/>
+          </a:stretch>
+        </p:blipFill>
+        <p:spPr>
+          <a:xfrm>
+            <a:off x="7315200" y="2362200"/>
+            <a:ext cx="1447800" cy="1447800"/>
+          </a:xfrm>
+          <a:prstGeom prst="rect">
+            <a:avLst/>
+          </a:prstGeom>
+        </p:spPr>
+      </p:pic>
+      <p:sp>
+        <p:nvSpPr>
+          <p:cNvPr id="7" name="TextBox 6"/>
+          <p:cNvSpPr txBox="1"/>
+          <p:nvPr/>
+        </p:nvSpPr>
+        <p:spPr>
+          <a:xfrm>
+            <a:off x="5029200" y="2057400"/>
+            <a:ext cx="3725374" cy="369332"/>
+          </a:xfrm>
+          <a:prstGeom prst="rect">
+            <a:avLst/>
+          </a:prstGeom>
+          <a:noFill/>
+        </p:spPr>
+        <p:txBody>
+          <a:bodyPr wrap="none" rtlCol="0">
+            <a:spAutoFit/>
+          </a:bodyPr>
+          <a:lstStyle/>
+          <a:p>
+            <a:r>
+              <a:rPr lang="en-US" dirty="0"/>
+              <a:t>https://</a:t>
+            </a:r>
+            <a:r>
+              <a:rPr lang="en-US" dirty="0" err="1"/>
+              <a:t>github.com</a:t>
+            </a:r>
+            <a:r>
+              <a:rPr lang="en-US" dirty="0"/>
+              <a:t>/phase4ground</a:t>
+            </a:r>
+          </a:p>
+        </p:txBody>
+      </p:sp>
+    </p:spTree>
+    <p:extLst>
+      <p:ext uri="{BB962C8B-B14F-4D97-AF65-F5344CB8AC3E}">
+        <p14:creationId xmlns:p14="http://schemas.microsoft.com/office/powerpoint/2010/main" val="2169168539"/>
+      </p:ext>
+    </p:extLst>
+  </p:cSld>
+  <p:clrMapOvr>
+    <a:masterClrMapping/>
+  </p:clrMapOvr>
+  <p:transition xmlns:p14="http://schemas.microsoft.com/office/powerpoint/2010/main" spd="slow">
+    <p:fade/>
+  </p:transition>
+  <p:timing>
+    <p:tnLst>
+      <p:par>
+        <p:cTn xmlns:p14="http://schemas.microsoft.com/office/powerpoint/2010/main" id="1" dur="indefinite" restart="never" nodeType="tmRoot"/>
+      </p:par>
+    </p:tnLst>
+  </p:timing>
+</p:sld>
+</file>
+
+<file path=ppt/slides/slide13.xml><?xml version="1.0" encoding="utf-8"?>
+<p:sld xmlns:a="http://schemas.openxmlformats.org/drawingml/2006/main" xmlns:r="http://schemas.openxmlformats.org/officeDocument/2006/relationships" xmlns:p="http://schemas.openxmlformats.org/presentationml/2006/main">
+  <p:cSld>
+    <p:spTree>
+      <p:nvGrpSpPr>
+        <p:cNvPr id="1" name=""/>
+        <p:cNvGrpSpPr/>
+        <p:nvPr/>
+      </p:nvGrpSpPr>
+      <p:grpSpPr>
+        <a:xfrm>
+          <a:off x="0" y="0"/>
+          <a:ext cx="0" cy="0"/>
+          <a:chOff x="0" y="0"/>
+          <a:chExt cx="0" cy="0"/>
+        </a:xfrm>
+      </p:grpSpPr>
+      <p:sp>
+        <p:nvSpPr>
           <p:cNvPr id="11" name="Title 10"/>
           <p:cNvSpPr>
             <a:spLocks noGrp="1"/>
@@ -36438,7 +36975,7 @@
 </p:sld>
 </file>
 
-<file path=ppt/slides/slide11.xml><?xml version="1.0" encoding="utf-8"?>
+<file path=ppt/slides/slide14.xml><?xml version="1.0" encoding="utf-8"?>
 <p:sld xmlns:a="http://schemas.openxmlformats.org/drawingml/2006/main" xmlns:r="http://schemas.openxmlformats.org/officeDocument/2006/relationships" xmlns:p="http://schemas.openxmlformats.org/presentationml/2006/main">
   <p:cSld>
     <p:spTree>
@@ -36528,7 +37065,7 @@
 </p:sld>
 </file>
 
-<file path=ppt/slides/slide12.xml><?xml version="1.0" encoding="utf-8"?>
+<file path=ppt/slides/slide15.xml><?xml version="1.0" encoding="utf-8"?>
 <p:sld xmlns:a="http://schemas.openxmlformats.org/drawingml/2006/main" xmlns:r="http://schemas.openxmlformats.org/officeDocument/2006/relationships" xmlns:p="http://schemas.openxmlformats.org/presentationml/2006/main">
   <p:cSld>
     <p:spTree>
@@ -36618,7 +37155,7 @@
 </p:sld>
 </file>
 
-<file path=ppt/slides/slide13.xml><?xml version="1.0" encoding="utf-8"?>
+<file path=ppt/slides/slide16.xml><?xml version="1.0" encoding="utf-8"?>
 <p:sld xmlns:a="http://schemas.openxmlformats.org/drawingml/2006/main" xmlns:r="http://schemas.openxmlformats.org/officeDocument/2006/relationships" xmlns:p="http://schemas.openxmlformats.org/presentationml/2006/main">
   <p:cSld>
     <p:spTree>
@@ -36652,7 +37189,11 @@
           <a:p>
             <a:r>
               <a:rPr lang="en-US" dirty="0" smtClean="0"/>
-              <a:t>Development System</a:t>
+              <a:t>Development </a:t>
+            </a:r>
+            <a:r>
+              <a:rPr lang="en-US" dirty="0" smtClean="0"/>
+              <a:t>System</a:t>
             </a:r>
             <a:endParaRPr lang="en-US" dirty="0"/>
           </a:p>
@@ -36721,7 +37262,7 @@
 </p:sld>
 </file>
 
-<file path=ppt/slides/slide14.xml><?xml version="1.0" encoding="utf-8"?>
+<file path=ppt/slides/slide17.xml><?xml version="1.0" encoding="utf-8"?>
 <p:sld xmlns:a="http://schemas.openxmlformats.org/drawingml/2006/main" xmlns:r="http://schemas.openxmlformats.org/officeDocument/2006/relationships" xmlns:p="http://schemas.openxmlformats.org/presentationml/2006/main">
   <p:cSld>
     <p:spTree>
@@ -36754,7 +37295,7 @@
 </p:sld>
 </file>
 
-<file path=ppt/slides/slide15.xml><?xml version="1.0" encoding="utf-8"?>
+<file path=ppt/slides/slide18.xml><?xml version="1.0" encoding="utf-8"?>
 <p:sld xmlns:a="http://schemas.openxmlformats.org/drawingml/2006/main" xmlns:r="http://schemas.openxmlformats.org/officeDocument/2006/relationships" xmlns:p="http://schemas.openxmlformats.org/presentationml/2006/main">
   <p:cSld>
     <p:spTree>
@@ -36817,7 +37358,7 @@
 </p:sld>
 </file>
 
-<file path=ppt/slides/slide16.xml><?xml version="1.0" encoding="utf-8"?>
+<file path=ppt/slides/slide19.xml><?xml version="1.0" encoding="utf-8"?>
 <p:sld xmlns:a="http://schemas.openxmlformats.org/drawingml/2006/main" xmlns:r="http://schemas.openxmlformats.org/officeDocument/2006/relationships" xmlns:p="http://schemas.openxmlformats.org/presentationml/2006/main">
   <p:cSld>
     <p:spTree>
@@ -37430,7 +37971,190 @@
 </p:sld>
 </file>
 
-<file path=ppt/slides/slide17.xml><?xml version="1.0" encoding="utf-8"?>
+<file path=ppt/slides/slide2.xml><?xml version="1.0" encoding="utf-8"?>
+<p:sld xmlns:a="http://schemas.openxmlformats.org/drawingml/2006/main" xmlns:r="http://schemas.openxmlformats.org/officeDocument/2006/relationships" xmlns:p="http://schemas.openxmlformats.org/presentationml/2006/main">
+  <p:cSld>
+    <p:spTree>
+      <p:nvGrpSpPr>
+        <p:cNvPr id="1" name=""/>
+        <p:cNvGrpSpPr/>
+        <p:nvPr/>
+      </p:nvGrpSpPr>
+      <p:grpSpPr>
+        <a:xfrm>
+          <a:off x="0" y="0"/>
+          <a:ext cx="0" cy="0"/>
+          <a:chOff x="0" y="0"/>
+          <a:chExt cx="0" cy="0"/>
+        </a:xfrm>
+      </p:grpSpPr>
+      <p:sp>
+        <p:nvSpPr>
+          <p:cNvPr id="2" name="Title 1"/>
+          <p:cNvSpPr>
+            <a:spLocks noGrp="1"/>
+          </p:cNvSpPr>
+          <p:nvPr>
+            <p:ph type="title"/>
+          </p:nvPr>
+        </p:nvSpPr>
+        <p:spPr>
+          <a:xfrm>
+            <a:off x="457200" y="914400"/>
+            <a:ext cx="4648200" cy="914400"/>
+          </a:xfrm>
+        </p:spPr>
+        <p:txBody>
+          <a:bodyPr/>
+          <a:lstStyle/>
+          <a:p>
+            <a:r>
+              <a:rPr lang="en-US" dirty="0" smtClean="0"/>
+              <a:t>Phase 4 </a:t>
+            </a:r>
+            <a:endParaRPr lang="en-US" dirty="0"/>
+          </a:p>
+        </p:txBody>
+      </p:sp>
+      <p:sp>
+        <p:nvSpPr>
+          <p:cNvPr id="5" name="Content Placeholder 4"/>
+          <p:cNvSpPr>
+            <a:spLocks noGrp="1"/>
+          </p:cNvSpPr>
+          <p:nvPr>
+            <p:ph idx="1"/>
+          </p:nvPr>
+        </p:nvSpPr>
+        <p:spPr>
+          <a:xfrm>
+            <a:off x="457200" y="1600201"/>
+            <a:ext cx="7924800" cy="1981200"/>
+          </a:xfrm>
+        </p:spPr>
+        <p:txBody>
+          <a:bodyPr/>
+          <a:lstStyle/>
+          <a:p>
+            <a:r>
+              <a:rPr lang="en-US" dirty="0"/>
+              <a:t>A digital microwave geosynchronous amateur radio satellite service system made possible by a partnership between Virginia Tech, AMSAT, and Millennium Space Systems. </a:t>
+            </a:r>
+          </a:p>
+        </p:txBody>
+      </p:sp>
+      <p:pic>
+        <p:nvPicPr>
+          <p:cNvPr id="7" name="Picture 6" descr="AMSATALTLOGO.png"/>
+          <p:cNvPicPr>
+            <a:picLocks noChangeAspect="1"/>
+          </p:cNvPicPr>
+          <p:nvPr/>
+        </p:nvPicPr>
+        <p:blipFill>
+          <a:blip r:embed="rId4">
+            <a:extLst>
+              <a:ext uri="{28A0092B-C50C-407E-A947-70E740481C1C}">
+                <a14:useLocalDpi xmlns:a14="http://schemas.microsoft.com/office/drawing/2010/main" val="0"/>
+              </a:ext>
+            </a:extLst>
+          </a:blip>
+          <a:stretch>
+            <a:fillRect/>
+          </a:stretch>
+        </p:blipFill>
+        <p:spPr>
+          <a:xfrm>
+            <a:off x="5181600" y="3352800"/>
+            <a:ext cx="3844636" cy="2819400"/>
+          </a:xfrm>
+          <a:prstGeom prst="rect">
+            <a:avLst/>
+          </a:prstGeom>
+        </p:spPr>
+      </p:pic>
+      <p:pic>
+        <p:nvPicPr>
+          <p:cNvPr id="8" name="Picture 7" descr="vt-logo-transparent-1200x258.png"/>
+          <p:cNvPicPr>
+            <a:picLocks noChangeAspect="1"/>
+          </p:cNvPicPr>
+          <p:nvPr/>
+        </p:nvPicPr>
+        <p:blipFill>
+          <a:blip r:embed="rId5">
+            <a:extLst>
+              <a:ext uri="{28A0092B-C50C-407E-A947-70E740481C1C}">
+                <a14:useLocalDpi xmlns:a14="http://schemas.microsoft.com/office/drawing/2010/main" val="0"/>
+              </a:ext>
+            </a:extLst>
+          </a:blip>
+          <a:stretch>
+            <a:fillRect/>
+          </a:stretch>
+        </p:blipFill>
+        <p:spPr>
+          <a:xfrm>
+            <a:off x="457200" y="3886200"/>
+            <a:ext cx="4267200" cy="917448"/>
+          </a:xfrm>
+          <a:prstGeom prst="rect">
+            <a:avLst/>
+          </a:prstGeom>
+        </p:spPr>
+      </p:pic>
+      <p:pic>
+        <p:nvPicPr>
+          <p:cNvPr id="9" name="Picture 8" descr="165415LOGO.jpeg"/>
+          <p:cNvPicPr>
+            <a:picLocks noChangeAspect="1"/>
+          </p:cNvPicPr>
+          <p:nvPr/>
+        </p:nvPicPr>
+        <p:blipFill>
+          <a:blip r:embed="rId6">
+            <a:extLst>
+              <a:ext uri="{28A0092B-C50C-407E-A947-70E740481C1C}">
+                <a14:useLocalDpi xmlns:a14="http://schemas.microsoft.com/office/drawing/2010/main" val="0"/>
+              </a:ext>
+            </a:extLst>
+          </a:blip>
+          <a:stretch>
+            <a:fillRect/>
+          </a:stretch>
+        </p:blipFill>
+        <p:spPr>
+          <a:xfrm>
+            <a:off x="304800" y="5334000"/>
+            <a:ext cx="4833646" cy="1066800"/>
+          </a:xfrm>
+          <a:prstGeom prst="rect">
+            <a:avLst/>
+          </a:prstGeom>
+        </p:spPr>
+      </p:pic>
+    </p:spTree>
+    <p:custDataLst>
+      <p:tags r:id="rId1"/>
+    </p:custDataLst>
+  </p:cSld>
+  <p:clrMapOvr>
+    <a:masterClrMapping/>
+  </p:clrMapOvr>
+  <p:transition xmlns:p14="http://schemas.microsoft.com/office/powerpoint/2010/main" spd="slow">
+    <p:fade/>
+  </p:transition>
+  <p:timing>
+    <p:tnLst>
+      <p:par>
+        <p:cTn xmlns:p14="http://schemas.microsoft.com/office/powerpoint/2010/main" id="1" dur="indefinite" restart="never" nodeType="tmRoot"/>
+      </p:par>
+    </p:tnLst>
+  </p:timing>
+</p:sld>
+</file>
+
+<file path=ppt/slides/slide20.xml><?xml version="1.0" encoding="utf-8"?>
 <p:sld xmlns:a="http://schemas.openxmlformats.org/drawingml/2006/main" xmlns:r="http://schemas.openxmlformats.org/officeDocument/2006/relationships" xmlns:p="http://schemas.openxmlformats.org/presentationml/2006/main">
   <p:cSld>
     <p:spTree>
@@ -38014,7 +38738,7 @@
 </p:sld>
 </file>
 
-<file path=ppt/slides/slide18.xml><?xml version="1.0" encoding="utf-8"?>
+<file path=ppt/slides/slide21.xml><?xml version="1.0" encoding="utf-8"?>
 <p:sld xmlns:a="http://schemas.openxmlformats.org/drawingml/2006/main" xmlns:r="http://schemas.openxmlformats.org/officeDocument/2006/relationships" xmlns:p="http://schemas.openxmlformats.org/presentationml/2006/main">
   <p:cSld>
     <p:spTree>
@@ -38192,7 +38916,7 @@
 </p:sld>
 </file>
 
-<file path=ppt/slides/slide19.xml><?xml version="1.0" encoding="utf-8"?>
+<file path=ppt/slides/slide22.xml><?xml version="1.0" encoding="utf-8"?>
 <p:sld xmlns:a="http://schemas.openxmlformats.org/drawingml/2006/main" xmlns:r="http://schemas.openxmlformats.org/officeDocument/2006/relationships" xmlns:p="http://schemas.openxmlformats.org/presentationml/2006/main">
   <p:cSld>
     <p:spTree>
@@ -38435,190 +39159,7 @@
 </p:sld>
 </file>
 
-<file path=ppt/slides/slide2.xml><?xml version="1.0" encoding="utf-8"?>
-<p:sld xmlns:a="http://schemas.openxmlformats.org/drawingml/2006/main" xmlns:r="http://schemas.openxmlformats.org/officeDocument/2006/relationships" xmlns:p="http://schemas.openxmlformats.org/presentationml/2006/main">
-  <p:cSld>
-    <p:spTree>
-      <p:nvGrpSpPr>
-        <p:cNvPr id="1" name=""/>
-        <p:cNvGrpSpPr/>
-        <p:nvPr/>
-      </p:nvGrpSpPr>
-      <p:grpSpPr>
-        <a:xfrm>
-          <a:off x="0" y="0"/>
-          <a:ext cx="0" cy="0"/>
-          <a:chOff x="0" y="0"/>
-          <a:chExt cx="0" cy="0"/>
-        </a:xfrm>
-      </p:grpSpPr>
-      <p:sp>
-        <p:nvSpPr>
-          <p:cNvPr id="2" name="Title 1"/>
-          <p:cNvSpPr>
-            <a:spLocks noGrp="1"/>
-          </p:cNvSpPr>
-          <p:nvPr>
-            <p:ph type="title"/>
-          </p:nvPr>
-        </p:nvSpPr>
-        <p:spPr>
-          <a:xfrm>
-            <a:off x="457200" y="914400"/>
-            <a:ext cx="4648200" cy="914400"/>
-          </a:xfrm>
-        </p:spPr>
-        <p:txBody>
-          <a:bodyPr/>
-          <a:lstStyle/>
-          <a:p>
-            <a:r>
-              <a:rPr lang="en-US" dirty="0" smtClean="0"/>
-              <a:t>Phase 4 </a:t>
-            </a:r>
-            <a:endParaRPr lang="en-US" dirty="0"/>
-          </a:p>
-        </p:txBody>
-      </p:sp>
-      <p:sp>
-        <p:nvSpPr>
-          <p:cNvPr id="5" name="Content Placeholder 4"/>
-          <p:cNvSpPr>
-            <a:spLocks noGrp="1"/>
-          </p:cNvSpPr>
-          <p:nvPr>
-            <p:ph idx="1"/>
-          </p:nvPr>
-        </p:nvSpPr>
-        <p:spPr>
-          <a:xfrm>
-            <a:off x="457200" y="1600201"/>
-            <a:ext cx="7924800" cy="1981200"/>
-          </a:xfrm>
-        </p:spPr>
-        <p:txBody>
-          <a:bodyPr/>
-          <a:lstStyle/>
-          <a:p>
-            <a:r>
-              <a:rPr lang="en-US" dirty="0"/>
-              <a:t>A digital microwave geosynchronous amateur radio satellite service system made possible by a partnership between Virginia Tech, AMSAT, and Millennium Space Systems. </a:t>
-            </a:r>
-          </a:p>
-        </p:txBody>
-      </p:sp>
-      <p:pic>
-        <p:nvPicPr>
-          <p:cNvPr id="7" name="Picture 6" descr="AMSATALTLOGO.png"/>
-          <p:cNvPicPr>
-            <a:picLocks noChangeAspect="1"/>
-          </p:cNvPicPr>
-          <p:nvPr/>
-        </p:nvPicPr>
-        <p:blipFill>
-          <a:blip r:embed="rId4">
-            <a:extLst>
-              <a:ext uri="{28A0092B-C50C-407E-A947-70E740481C1C}">
-                <a14:useLocalDpi xmlns:a14="http://schemas.microsoft.com/office/drawing/2010/main" val="0"/>
-              </a:ext>
-            </a:extLst>
-          </a:blip>
-          <a:stretch>
-            <a:fillRect/>
-          </a:stretch>
-        </p:blipFill>
-        <p:spPr>
-          <a:xfrm>
-            <a:off x="5181600" y="3352800"/>
-            <a:ext cx="3844636" cy="2819400"/>
-          </a:xfrm>
-          <a:prstGeom prst="rect">
-            <a:avLst/>
-          </a:prstGeom>
-        </p:spPr>
-      </p:pic>
-      <p:pic>
-        <p:nvPicPr>
-          <p:cNvPr id="8" name="Picture 7" descr="vt-logo-transparent-1200x258.png"/>
-          <p:cNvPicPr>
-            <a:picLocks noChangeAspect="1"/>
-          </p:cNvPicPr>
-          <p:nvPr/>
-        </p:nvPicPr>
-        <p:blipFill>
-          <a:blip r:embed="rId5">
-            <a:extLst>
-              <a:ext uri="{28A0092B-C50C-407E-A947-70E740481C1C}">
-                <a14:useLocalDpi xmlns:a14="http://schemas.microsoft.com/office/drawing/2010/main" val="0"/>
-              </a:ext>
-            </a:extLst>
-          </a:blip>
-          <a:stretch>
-            <a:fillRect/>
-          </a:stretch>
-        </p:blipFill>
-        <p:spPr>
-          <a:xfrm>
-            <a:off x="457200" y="3886200"/>
-            <a:ext cx="4267200" cy="917448"/>
-          </a:xfrm>
-          <a:prstGeom prst="rect">
-            <a:avLst/>
-          </a:prstGeom>
-        </p:spPr>
-      </p:pic>
-      <p:pic>
-        <p:nvPicPr>
-          <p:cNvPr id="9" name="Picture 8" descr="165415LOGO.jpeg"/>
-          <p:cNvPicPr>
-            <a:picLocks noChangeAspect="1"/>
-          </p:cNvPicPr>
-          <p:nvPr/>
-        </p:nvPicPr>
-        <p:blipFill>
-          <a:blip r:embed="rId6">
-            <a:extLst>
-              <a:ext uri="{28A0092B-C50C-407E-A947-70E740481C1C}">
-                <a14:useLocalDpi xmlns:a14="http://schemas.microsoft.com/office/drawing/2010/main" val="0"/>
-              </a:ext>
-            </a:extLst>
-          </a:blip>
-          <a:stretch>
-            <a:fillRect/>
-          </a:stretch>
-        </p:blipFill>
-        <p:spPr>
-          <a:xfrm>
-            <a:off x="304800" y="5334000"/>
-            <a:ext cx="4833646" cy="1066800"/>
-          </a:xfrm>
-          <a:prstGeom prst="rect">
-            <a:avLst/>
-          </a:prstGeom>
-        </p:spPr>
-      </p:pic>
-    </p:spTree>
-    <p:custDataLst>
-      <p:tags r:id="rId1"/>
-    </p:custDataLst>
-  </p:cSld>
-  <p:clrMapOvr>
-    <a:masterClrMapping/>
-  </p:clrMapOvr>
-  <p:transition xmlns:p14="http://schemas.microsoft.com/office/powerpoint/2010/main" spd="slow">
-    <p:fade/>
-  </p:transition>
-  <p:timing>
-    <p:tnLst>
-      <p:par>
-        <p:cTn xmlns:p14="http://schemas.microsoft.com/office/powerpoint/2010/main" id="1" dur="indefinite" restart="never" nodeType="tmRoot"/>
-      </p:par>
-    </p:tnLst>
-  </p:timing>
-</p:sld>
-</file>
-
-<file path=ppt/slides/slide20.xml><?xml version="1.0" encoding="utf-8"?>
+<file path=ppt/slides/slide23.xml><?xml version="1.0" encoding="utf-8"?>
 <p:sld xmlns:a="http://schemas.openxmlformats.org/drawingml/2006/main" xmlns:r="http://schemas.openxmlformats.org/officeDocument/2006/relationships" xmlns:p="http://schemas.openxmlformats.org/presentationml/2006/main">
   <p:cSld>
     <p:spTree>
@@ -38695,7 +39236,7 @@
 </p:sld>
 </file>
 
-<file path=ppt/slides/slide21.xml><?xml version="1.0" encoding="utf-8"?>
+<file path=ppt/slides/slide24.xml><?xml version="1.0" encoding="utf-8"?>
 <p:sld xmlns:a="http://schemas.openxmlformats.org/drawingml/2006/main" xmlns:r="http://schemas.openxmlformats.org/officeDocument/2006/relationships" xmlns:p="http://schemas.openxmlformats.org/presentationml/2006/main">
   <p:cSld>
     <p:spTree>
@@ -40607,7 +41148,15 @@
             </a:pPr>
             <a:r>
               <a:rPr lang="en-US" dirty="0" smtClean="0"/>
-              <a:t>This mission (Phase 4b) is expected to last at least a year, but possibly more, before the satellite is placed in a parking orbit. This means that satellite service will be for a limited time on this mission. We are hoping to leverage this successful mission into having our own geosynchronous satellite (or satellites) with a longer life. Phase 4a is a AMSAT-DN project.</a:t>
+              <a:t>This mission (Phase 4b) is expected to last at least a year, but possibly </a:t>
+            </a:r>
+            <a:r>
+              <a:rPr lang="en-US" dirty="0" smtClean="0"/>
+              <a:t>four, </a:t>
+            </a:r>
+            <a:r>
+              <a:rPr lang="en-US" dirty="0" smtClean="0"/>
+              <a:t>before the satellite is placed in a parking orbit. This means that satellite service will be for a limited time on this mission. We are hoping to leverage this successful mission into having our own geosynchronous satellite (or satellites) with a longer life. Phase 4a is a AMSAT-DN project.</a:t>
             </a:r>
           </a:p>
         </p:txBody>
@@ -40694,6 +41243,222 @@
           <a:chExt cx="0" cy="0"/>
         </a:xfrm>
       </p:grpSpPr>
+      <p:pic>
+        <p:nvPicPr>
+          <p:cNvPr id="7" name="Picture 6" descr="modulation_overview.jpg"/>
+          <p:cNvPicPr>
+            <a:picLocks noChangeAspect="1"/>
+          </p:cNvPicPr>
+          <p:nvPr/>
+        </p:nvPicPr>
+        <p:blipFill rotWithShape="1">
+          <a:blip r:embed="rId2">
+            <a:extLst>
+              <a:ext uri="{28A0092B-C50C-407E-A947-70E740481C1C}">
+                <a14:useLocalDpi xmlns:a14="http://schemas.microsoft.com/office/drawing/2010/main" val="0"/>
+              </a:ext>
+            </a:extLst>
+          </a:blip>
+          <a:srcRect t="11628"/>
+          <a:stretch/>
+        </p:blipFill>
+        <p:spPr>
+          <a:xfrm>
+            <a:off x="0" y="797484"/>
+            <a:ext cx="5967779" cy="6060515"/>
+          </a:xfrm>
+          <a:prstGeom prst="rect">
+            <a:avLst/>
+          </a:prstGeom>
+        </p:spPr>
+      </p:pic>
+      <p:sp>
+        <p:nvSpPr>
+          <p:cNvPr id="8" name="TextBox 7"/>
+          <p:cNvSpPr txBox="1"/>
+          <p:nvPr/>
+        </p:nvSpPr>
+        <p:spPr>
+          <a:xfrm>
+            <a:off x="5486400" y="1295400"/>
+            <a:ext cx="2219102" cy="646331"/>
+          </a:xfrm>
+          <a:prstGeom prst="rect">
+            <a:avLst/>
+          </a:prstGeom>
+          <a:noFill/>
+        </p:spPr>
+        <p:txBody>
+          <a:bodyPr wrap="none" rtlCol="0">
+            <a:spAutoFit/>
+          </a:bodyPr>
+          <a:lstStyle/>
+          <a:p>
+            <a:r>
+              <a:rPr lang="en-US" sz="3600" dirty="0" smtClean="0"/>
+              <a:t>Use Cases</a:t>
+            </a:r>
+            <a:endParaRPr lang="en-US" sz="3600" dirty="0"/>
+          </a:p>
+        </p:txBody>
+      </p:sp>
+    </p:spTree>
+    <p:extLst>
+      <p:ext uri="{BB962C8B-B14F-4D97-AF65-F5344CB8AC3E}">
+        <p14:creationId xmlns:p14="http://schemas.microsoft.com/office/powerpoint/2010/main" val="1250370285"/>
+      </p:ext>
+    </p:extLst>
+  </p:cSld>
+  <p:clrMapOvr>
+    <a:masterClrMapping/>
+  </p:clrMapOvr>
+  <p:transition xmlns:p14="http://schemas.microsoft.com/office/powerpoint/2010/main" spd="slow">
+    <p:fade/>
+  </p:transition>
+</p:sld>
+</file>
+
+<file path=ppt/slides/slide6.xml><?xml version="1.0" encoding="utf-8"?>
+<p:sld xmlns:a="http://schemas.openxmlformats.org/drawingml/2006/main" xmlns:r="http://schemas.openxmlformats.org/officeDocument/2006/relationships" xmlns:p="http://schemas.openxmlformats.org/presentationml/2006/main">
+  <p:cSld>
+    <p:spTree>
+      <p:nvGrpSpPr>
+        <p:cNvPr id="1" name=""/>
+        <p:cNvGrpSpPr/>
+        <p:nvPr/>
+      </p:nvGrpSpPr>
+      <p:grpSpPr>
+        <a:xfrm>
+          <a:off x="0" y="0"/>
+          <a:ext cx="0" cy="0"/>
+          <a:chOff x="0" y="0"/>
+          <a:chExt cx="0" cy="0"/>
+        </a:xfrm>
+      </p:grpSpPr>
+      <p:pic>
+        <p:nvPicPr>
+          <p:cNvPr id="2" name="Picture 1" descr="modulation_overview_2.jpg"/>
+          <p:cNvPicPr>
+            <a:picLocks noChangeAspect="1"/>
+          </p:cNvPicPr>
+          <p:nvPr/>
+        </p:nvPicPr>
+        <p:blipFill rotWithShape="1">
+          <a:blip r:embed="rId2">
+            <a:extLst>
+              <a:ext uri="{28A0092B-C50C-407E-A947-70E740481C1C}">
+                <a14:useLocalDpi xmlns:a14="http://schemas.microsoft.com/office/drawing/2010/main" val="0"/>
+              </a:ext>
+            </a:extLst>
+          </a:blip>
+          <a:srcRect t="11844"/>
+          <a:stretch/>
+        </p:blipFill>
+        <p:spPr>
+          <a:xfrm>
+            <a:off x="1905000" y="812252"/>
+            <a:ext cx="5750317" cy="6045747"/>
+          </a:xfrm>
+          <a:prstGeom prst="rect">
+            <a:avLst/>
+          </a:prstGeom>
+        </p:spPr>
+      </p:pic>
+    </p:spTree>
+    <p:extLst>
+      <p:ext uri="{BB962C8B-B14F-4D97-AF65-F5344CB8AC3E}">
+        <p14:creationId xmlns:p14="http://schemas.microsoft.com/office/powerpoint/2010/main" val="3252623"/>
+      </p:ext>
+    </p:extLst>
+  </p:cSld>
+  <p:clrMapOvr>
+    <a:masterClrMapping/>
+  </p:clrMapOvr>
+  <p:transition xmlns:p14="http://schemas.microsoft.com/office/powerpoint/2010/main" spd="slow">
+    <p:fade/>
+  </p:transition>
+</p:sld>
+</file>
+
+<file path=ppt/slides/slide7.xml><?xml version="1.0" encoding="utf-8"?>
+<p:sld xmlns:a="http://schemas.openxmlformats.org/drawingml/2006/main" xmlns:r="http://schemas.openxmlformats.org/officeDocument/2006/relationships" xmlns:p="http://schemas.openxmlformats.org/presentationml/2006/main">
+  <p:cSld>
+    <p:spTree>
+      <p:nvGrpSpPr>
+        <p:cNvPr id="1" name=""/>
+        <p:cNvGrpSpPr/>
+        <p:nvPr/>
+      </p:nvGrpSpPr>
+      <p:grpSpPr>
+        <a:xfrm>
+          <a:off x="0" y="0"/>
+          <a:ext cx="0" cy="0"/>
+          <a:chOff x="0" y="0"/>
+          <a:chExt cx="0" cy="0"/>
+        </a:xfrm>
+      </p:grpSpPr>
+      <p:pic>
+        <p:nvPicPr>
+          <p:cNvPr id="2" name="Picture 1" descr="modulation_overview_3.jpg"/>
+          <p:cNvPicPr>
+            <a:picLocks noChangeAspect="1"/>
+          </p:cNvPicPr>
+          <p:nvPr/>
+        </p:nvPicPr>
+        <p:blipFill rotWithShape="1">
+          <a:blip r:embed="rId2">
+            <a:extLst>
+              <a:ext uri="{28A0092B-C50C-407E-A947-70E740481C1C}">
+                <a14:useLocalDpi xmlns:a14="http://schemas.microsoft.com/office/drawing/2010/main" val="0"/>
+              </a:ext>
+            </a:extLst>
+          </a:blip>
+          <a:srcRect l="8450" t="9045" r="6607"/>
+          <a:stretch/>
+        </p:blipFill>
+        <p:spPr>
+          <a:xfrm>
+            <a:off x="3294197" y="620266"/>
+            <a:ext cx="5773603" cy="6237734"/>
+          </a:xfrm>
+          <a:prstGeom prst="rect">
+            <a:avLst/>
+          </a:prstGeom>
+        </p:spPr>
+      </p:pic>
+    </p:spTree>
+    <p:extLst>
+      <p:ext uri="{BB962C8B-B14F-4D97-AF65-F5344CB8AC3E}">
+        <p14:creationId xmlns:p14="http://schemas.microsoft.com/office/powerpoint/2010/main" val="2836226786"/>
+      </p:ext>
+    </p:extLst>
+  </p:cSld>
+  <p:clrMapOvr>
+    <a:masterClrMapping/>
+  </p:clrMapOvr>
+  <p:transition xmlns:p14="http://schemas.microsoft.com/office/powerpoint/2010/main" spd="slow">
+    <p:fade/>
+  </p:transition>
+</p:sld>
+</file>
+
+<file path=ppt/slides/slide8.xml><?xml version="1.0" encoding="utf-8"?>
+<p:sld xmlns:a="http://schemas.openxmlformats.org/drawingml/2006/main" xmlns:r="http://schemas.openxmlformats.org/officeDocument/2006/relationships" xmlns:p="http://schemas.openxmlformats.org/presentationml/2006/main">
+  <p:cSld>
+    <p:spTree>
+      <p:nvGrpSpPr>
+        <p:cNvPr id="1" name=""/>
+        <p:cNvGrpSpPr/>
+        <p:nvPr/>
+      </p:nvGrpSpPr>
+      <p:grpSpPr>
+        <a:xfrm>
+          <a:off x="0" y="0"/>
+          <a:ext cx="0" cy="0"/>
+          <a:chOff x="0" y="0"/>
+          <a:chExt cx="0" cy="0"/>
+        </a:xfrm>
+      </p:grpSpPr>
       <p:sp>
         <p:nvSpPr>
           <p:cNvPr id="2" name="Title 1"/>
@@ -40746,23 +41511,7 @@
           <a:p>
             <a:r>
               <a:rPr lang="en-US" dirty="0" smtClean="0"/>
-              <a:t>Palomar Amateur Radio Club, Escondido Amateur Radio Society, Dixon Lake Recreation Area, </a:t>
-            </a:r>
-            <a:r>
-              <a:rPr lang="en-US" dirty="0" smtClean="0"/>
-              <a:t>North Texas Microwave </a:t>
-            </a:r>
-            <a:r>
-              <a:rPr lang="en-US" dirty="0" smtClean="0"/>
-              <a:t>Society, </a:t>
-            </a:r>
-            <a:r>
-              <a:rPr lang="en-US" dirty="0" smtClean="0"/>
-              <a:t>Federal </a:t>
-            </a:r>
-            <a:r>
-              <a:rPr lang="en-US" dirty="0" smtClean="0"/>
-              <a:t>Emergency Management Agency, Amateur Radio Relay League…</a:t>
+              <a:t>Palomar Amateur Radio Club, Escondido Amateur Radio Society, Dixon Lake Recreation Area, North Texas Microwave Society, Federal Emergency Management Agency, Amateur Radio Relay League…</a:t>
             </a:r>
           </a:p>
         </p:txBody>
@@ -40943,7 +41692,7 @@
 </p:sld>
 </file>
 
-<file path=ppt/slides/slide6.xml><?xml version="1.0" encoding="utf-8"?>
+<file path=ppt/slides/slide9.xml><?xml version="1.0" encoding="utf-8"?>
 <p:sld xmlns:a="http://schemas.openxmlformats.org/drawingml/2006/main" xmlns:r="http://schemas.openxmlformats.org/officeDocument/2006/relationships" xmlns:p="http://schemas.openxmlformats.org/presentationml/2006/main">
   <p:cSld>
     <p:spTree>
@@ -41021,546 +41770,6 @@
   <p:transition xmlns:p14="http://schemas.microsoft.com/office/powerpoint/2010/main" spd="slow">
     <p:fade/>
   </p:transition>
-</p:sld>
-</file>
-
-<file path=ppt/slides/slide7.xml><?xml version="1.0" encoding="utf-8"?>
-<p:sld xmlns:a="http://schemas.openxmlformats.org/drawingml/2006/main" xmlns:r="http://schemas.openxmlformats.org/officeDocument/2006/relationships" xmlns:p="http://schemas.openxmlformats.org/presentationml/2006/main">
-  <p:cSld>
-    <p:spTree>
-      <p:nvGrpSpPr>
-        <p:cNvPr id="1" name=""/>
-        <p:cNvGrpSpPr/>
-        <p:nvPr/>
-      </p:nvGrpSpPr>
-      <p:grpSpPr>
-        <a:xfrm>
-          <a:off x="0" y="0"/>
-          <a:ext cx="0" cy="0"/>
-          <a:chOff x="0" y="0"/>
-          <a:chExt cx="0" cy="0"/>
-        </a:xfrm>
-      </p:grpSpPr>
-      <p:sp>
-        <p:nvSpPr>
-          <p:cNvPr id="2" name="Title 1"/>
-          <p:cNvSpPr>
-            <a:spLocks noGrp="1"/>
-          </p:cNvSpPr>
-          <p:nvPr>
-            <p:ph type="title"/>
-            <p:custDataLst>
-              <p:tags r:id="rId2"/>
-            </p:custDataLst>
-          </p:nvPr>
-        </p:nvSpPr>
-        <p:spPr/>
-        <p:txBody>
-          <a:bodyPr/>
-          <a:lstStyle/>
-          <a:p>
-            <a:r>
-              <a:rPr lang="en-US" dirty="0" smtClean="0"/>
-              <a:t>Current Status</a:t>
-            </a:r>
-            <a:endParaRPr lang="en-US" dirty="0"/>
-          </a:p>
-        </p:txBody>
-      </p:sp>
-      <p:sp>
-        <p:nvSpPr>
-          <p:cNvPr id="4" name="Content Placeholder 3"/>
-          <p:cNvSpPr>
-            <a:spLocks noGrp="1"/>
-          </p:cNvSpPr>
-          <p:nvPr>
-            <p:ph idx="1"/>
-          </p:nvPr>
-        </p:nvSpPr>
-        <p:spPr/>
-        <p:txBody>
-          <a:bodyPr/>
-          <a:lstStyle/>
-          <a:p>
-            <a:pPr>
-              <a:lnSpc>
-                <a:spcPct val="150000"/>
-              </a:lnSpc>
-            </a:pPr>
-            <a:r>
-              <a:rPr lang="en-US" dirty="0" smtClean="0"/>
-              <a:t>We have a growing team of 40 volunteers/employees </a:t>
-            </a:r>
-          </a:p>
-          <a:p>
-            <a:pPr>
-              <a:lnSpc>
-                <a:spcPct val="150000"/>
-              </a:lnSpc>
-            </a:pPr>
-            <a:r>
-              <a:rPr lang="en-US" dirty="0" smtClean="0"/>
-              <a:t>A $</a:t>
-            </a:r>
-            <a:r>
-              <a:rPr lang="en-US" dirty="0" smtClean="0"/>
-              <a:t>100,000+ </a:t>
-            </a:r>
-            <a:r>
-              <a:rPr lang="en-US" dirty="0" smtClean="0"/>
-              <a:t>rideshare payload study at MSS is underway</a:t>
-            </a:r>
-            <a:endParaRPr lang="en-US" dirty="0"/>
-          </a:p>
-          <a:p>
-            <a:pPr>
-              <a:lnSpc>
-                <a:spcPct val="150000"/>
-              </a:lnSpc>
-            </a:pPr>
-            <a:r>
-              <a:rPr lang="en-US" dirty="0" smtClean="0"/>
-              <a:t>We are expecting a late 2016 or early 2017 launch</a:t>
-            </a:r>
-          </a:p>
-          <a:p>
-            <a:pPr>
-              <a:lnSpc>
-                <a:spcPct val="150000"/>
-              </a:lnSpc>
-            </a:pPr>
-            <a:r>
-              <a:rPr lang="en-US" dirty="0" smtClean="0"/>
-              <a:t>We will have 100 watts of power from the spacecraft</a:t>
-            </a:r>
-          </a:p>
-          <a:p>
-            <a:pPr>
-              <a:lnSpc>
-                <a:spcPct val="150000"/>
-              </a:lnSpc>
-            </a:pPr>
-            <a:r>
-              <a:rPr lang="en-US" dirty="0" smtClean="0"/>
-              <a:t>We will enjoy access to the </a:t>
-            </a:r>
-            <a:r>
-              <a:rPr lang="en-US" dirty="0" err="1" smtClean="0"/>
-              <a:t>coldplate</a:t>
-            </a:r>
-            <a:endParaRPr lang="en-US" dirty="0" smtClean="0"/>
-          </a:p>
-          <a:p>
-            <a:pPr>
-              <a:lnSpc>
-                <a:spcPct val="150000"/>
-              </a:lnSpc>
-            </a:pPr>
-            <a:r>
-              <a:rPr lang="en-US" dirty="0" smtClean="0"/>
-              <a:t>We can use several external areas on the spacecraft for antennas</a:t>
-            </a:r>
-          </a:p>
-          <a:p>
-            <a:pPr>
-              <a:lnSpc>
-                <a:spcPct val="150000"/>
-              </a:lnSpc>
-            </a:pPr>
-            <a:r>
-              <a:rPr lang="en-US" dirty="0" smtClean="0"/>
-              <a:t>We do not control the spacecraft</a:t>
-            </a:r>
-          </a:p>
-          <a:p>
-            <a:pPr>
-              <a:lnSpc>
-                <a:spcPct val="150000"/>
-              </a:lnSpc>
-            </a:pPr>
-            <a:r>
-              <a:rPr lang="en-US" dirty="0"/>
-              <a:t>G</a:t>
-            </a:r>
-            <a:r>
-              <a:rPr lang="en-US" dirty="0" smtClean="0"/>
-              <a:t>round station development is completely open source</a:t>
-            </a:r>
-          </a:p>
-          <a:p>
-            <a:pPr>
-              <a:lnSpc>
-                <a:spcPct val="150000"/>
-              </a:lnSpc>
-            </a:pPr>
-            <a:r>
-              <a:rPr lang="en-US" dirty="0" smtClean="0"/>
-              <a:t>Space segment development is ITAR controlled </a:t>
-            </a:r>
-          </a:p>
-        </p:txBody>
-      </p:sp>
-    </p:spTree>
-    <p:custDataLst>
-      <p:tags r:id="rId1"/>
-    </p:custDataLst>
-  </p:cSld>
-  <p:clrMapOvr>
-    <a:masterClrMapping/>
-  </p:clrMapOvr>
-  <p:transition xmlns:p14="http://schemas.microsoft.com/office/powerpoint/2010/main" spd="slow">
-    <p:fade/>
-  </p:transition>
-  <p:timing>
-    <p:tnLst>
-      <p:par>
-        <p:cTn xmlns:p14="http://schemas.microsoft.com/office/powerpoint/2010/main" id="1" dur="indefinite" restart="never" nodeType="tmRoot"/>
-      </p:par>
-    </p:tnLst>
-  </p:timing>
-</p:sld>
-</file>
-
-<file path=ppt/slides/slide8.xml><?xml version="1.0" encoding="utf-8"?>
-<p:sld xmlns:a="http://schemas.openxmlformats.org/drawingml/2006/main" xmlns:r="http://schemas.openxmlformats.org/officeDocument/2006/relationships" xmlns:p="http://schemas.openxmlformats.org/presentationml/2006/main">
-  <p:cSld>
-    <p:spTree>
-      <p:nvGrpSpPr>
-        <p:cNvPr id="1" name=""/>
-        <p:cNvGrpSpPr/>
-        <p:nvPr/>
-      </p:nvGrpSpPr>
-      <p:grpSpPr>
-        <a:xfrm>
-          <a:off x="0" y="0"/>
-          <a:ext cx="0" cy="0"/>
-          <a:chOff x="0" y="0"/>
-          <a:chExt cx="0" cy="0"/>
-        </a:xfrm>
-      </p:grpSpPr>
-      <p:sp>
-        <p:nvSpPr>
-          <p:cNvPr id="2" name="Title 1"/>
-          <p:cNvSpPr>
-            <a:spLocks noGrp="1"/>
-          </p:cNvSpPr>
-          <p:nvPr>
-            <p:ph type="title"/>
-          </p:nvPr>
-        </p:nvSpPr>
-        <p:spPr/>
-        <p:txBody>
-          <a:bodyPr/>
-          <a:lstStyle/>
-          <a:p>
-            <a:r>
-              <a:rPr lang="en-US" dirty="0" smtClean="0"/>
-              <a:t>Issues and Resolutions</a:t>
-            </a:r>
-            <a:endParaRPr lang="en-US" dirty="0"/>
-          </a:p>
-        </p:txBody>
-      </p:sp>
-      <p:sp>
-        <p:nvSpPr>
-          <p:cNvPr id="5" name="Content Placeholder 4"/>
-          <p:cNvSpPr>
-            <a:spLocks noGrp="1"/>
-          </p:cNvSpPr>
-          <p:nvPr>
-            <p:ph idx="1"/>
-          </p:nvPr>
-        </p:nvSpPr>
-        <p:spPr/>
-        <p:txBody>
-          <a:bodyPr>
-            <a:normAutofit fontScale="92500" lnSpcReduction="10000"/>
-          </a:bodyPr>
-          <a:lstStyle/>
-          <a:p>
-            <a:pPr>
-              <a:lnSpc>
-                <a:spcPct val="150000"/>
-              </a:lnSpc>
-            </a:pPr>
-            <a:r>
-              <a:rPr lang="en-US" dirty="0" smtClean="0"/>
-              <a:t>International Traffic in Arms Regulations directly </a:t>
-            </a:r>
-            <a:r>
-              <a:rPr lang="en-US" dirty="0" smtClean="0"/>
-              <a:t>affects this </a:t>
-            </a:r>
-            <a:r>
-              <a:rPr lang="en-US" dirty="0" smtClean="0"/>
-              <a:t>project</a:t>
-            </a:r>
-          </a:p>
-          <a:p>
-            <a:r>
-              <a:rPr lang="en-US" dirty="0"/>
-              <a:t>What and how did it impact the project?</a:t>
-            </a:r>
-          </a:p>
-          <a:p>
-            <a:pPr lvl="1"/>
-            <a:r>
-              <a:rPr lang="en-US" dirty="0"/>
-              <a:t>Time wasted, stress increased, harsh and unnecessary limits on human </a:t>
-            </a:r>
-            <a:r>
-              <a:rPr lang="en-US" dirty="0" smtClean="0"/>
-              <a:t>resources</a:t>
-            </a:r>
-          </a:p>
-          <a:p>
-            <a:pPr>
-              <a:lnSpc>
-                <a:spcPct val="150000"/>
-              </a:lnSpc>
-            </a:pPr>
-            <a:r>
-              <a:rPr lang="en-US" dirty="0" smtClean="0"/>
-              <a:t>Splitting up the project into </a:t>
-            </a:r>
-            <a:r>
-              <a:rPr lang="en-US" b="1" dirty="0" smtClean="0"/>
-              <a:t>Ground</a:t>
-            </a:r>
-            <a:r>
-              <a:rPr lang="en-US" dirty="0" smtClean="0"/>
-              <a:t> and </a:t>
-            </a:r>
-            <a:r>
-              <a:rPr lang="en-US" b="1" dirty="0"/>
-              <a:t>S</a:t>
-            </a:r>
-            <a:r>
-              <a:rPr lang="en-US" b="1" dirty="0" smtClean="0"/>
-              <a:t>pace</a:t>
-            </a:r>
-            <a:r>
-              <a:rPr lang="en-US" dirty="0" smtClean="0"/>
-              <a:t> allowed for open source development of the ground station while enabling the space segment development to continue to comply with ITAR. </a:t>
-            </a:r>
-          </a:p>
-          <a:p>
-            <a:pPr>
-              <a:lnSpc>
-                <a:spcPct val="150000"/>
-              </a:lnSpc>
-            </a:pPr>
-            <a:r>
-              <a:rPr lang="en-US" dirty="0" smtClean="0"/>
-              <a:t>Teams are now separate and communicate through the Air Interface Document, which defines the radio link between satellite and stations on the ground.</a:t>
-            </a:r>
-            <a:endParaRPr lang="en-US" dirty="0"/>
-          </a:p>
-        </p:txBody>
-      </p:sp>
-    </p:spTree>
-    <p:custDataLst>
-      <p:tags r:id="rId1"/>
-    </p:custDataLst>
-  </p:cSld>
-  <p:clrMapOvr>
-    <a:masterClrMapping/>
-  </p:clrMapOvr>
-  <p:transition xmlns:p14="http://schemas.microsoft.com/office/powerpoint/2010/main" spd="slow">
-    <p:fade/>
-  </p:transition>
-  <p:timing>
-    <p:tnLst>
-      <p:par>
-        <p:cTn xmlns:p14="http://schemas.microsoft.com/office/powerpoint/2010/main" id="1" dur="indefinite" restart="never" nodeType="tmRoot"/>
-      </p:par>
-    </p:tnLst>
-  </p:timing>
-</p:sld>
-</file>
-
-<file path=ppt/slides/slide9.xml><?xml version="1.0" encoding="utf-8"?>
-<p:sld xmlns:a="http://schemas.openxmlformats.org/drawingml/2006/main" xmlns:r="http://schemas.openxmlformats.org/officeDocument/2006/relationships" xmlns:p="http://schemas.openxmlformats.org/presentationml/2006/main">
-  <p:cSld>
-    <p:spTree>
-      <p:nvGrpSpPr>
-        <p:cNvPr id="1" name=""/>
-        <p:cNvGrpSpPr/>
-        <p:nvPr/>
-      </p:nvGrpSpPr>
-      <p:grpSpPr>
-        <a:xfrm>
-          <a:off x="0" y="0"/>
-          <a:ext cx="0" cy="0"/>
-          <a:chOff x="0" y="0"/>
-          <a:chExt cx="0" cy="0"/>
-        </a:xfrm>
-      </p:grpSpPr>
-      <p:sp>
-        <p:nvSpPr>
-          <p:cNvPr id="2" name="Title 1"/>
-          <p:cNvSpPr>
-            <a:spLocks noGrp="1"/>
-          </p:cNvSpPr>
-          <p:nvPr>
-            <p:ph type="title"/>
-          </p:nvPr>
-        </p:nvSpPr>
-        <p:spPr/>
-        <p:txBody>
-          <a:bodyPr/>
-          <a:lstStyle/>
-          <a:p>
-            <a:r>
-              <a:rPr lang="en-US" dirty="0" smtClean="0"/>
-              <a:t>Phase 4 Top-level Team Structure</a:t>
-            </a:r>
-            <a:endParaRPr lang="en-US" dirty="0"/>
-          </a:p>
-        </p:txBody>
-      </p:sp>
-      <p:graphicFrame>
-        <p:nvGraphicFramePr>
-          <p:cNvPr id="4" name="Content Placeholder 3"/>
-          <p:cNvGraphicFramePr>
-            <a:graphicFrameLocks noGrp="1"/>
-          </p:cNvGraphicFramePr>
-          <p:nvPr>
-            <p:ph idx="1"/>
-            <p:extLst>
-              <p:ext uri="{D42A27DB-BD31-4B8C-83A1-F6EECF244321}">
-                <p14:modId xmlns:p14="http://schemas.microsoft.com/office/powerpoint/2010/main" val="2475042945"/>
-              </p:ext>
-            </p:extLst>
-          </p:nvPr>
-        </p:nvGraphicFramePr>
-        <p:xfrm>
-          <a:off x="457200" y="1828800"/>
-          <a:ext cx="8229600" cy="4297363"/>
-        </p:xfrm>
-        <a:graphic>
-          <a:graphicData uri="http://schemas.openxmlformats.org/drawingml/2006/diagram">
-            <dgm:relIds xmlns:dgm="http://schemas.openxmlformats.org/drawingml/2006/diagram" xmlns:r="http://schemas.openxmlformats.org/officeDocument/2006/relationships" r:dm="rId3" r:lo="rId4" r:qs="rId5" r:cs="rId6"/>
-          </a:graphicData>
-        </a:graphic>
-      </p:graphicFrame>
-      <p:pic>
-        <p:nvPicPr>
-          <p:cNvPr id="5" name="Picture 4" descr="12015062_10153001489786883_1121530478985270090_o.jpg"/>
-          <p:cNvPicPr>
-            <a:picLocks noChangeAspect="1"/>
-          </p:cNvPicPr>
-          <p:nvPr/>
-        </p:nvPicPr>
-        <p:blipFill>
-          <a:blip r:embed="rId8">
-            <a:extLst>
-              <a:ext uri="{28A0092B-C50C-407E-A947-70E740481C1C}">
-                <a14:useLocalDpi xmlns:a14="http://schemas.microsoft.com/office/drawing/2010/main" val="0"/>
-              </a:ext>
-            </a:extLst>
-          </a:blip>
-          <a:stretch>
-            <a:fillRect/>
-          </a:stretch>
-        </p:blipFill>
-        <p:spPr>
-          <a:xfrm>
-            <a:off x="304800" y="3810000"/>
-            <a:ext cx="4191000" cy="2357438"/>
-          </a:xfrm>
-          <a:prstGeom prst="rect">
-            <a:avLst/>
-          </a:prstGeom>
-        </p:spPr>
-      </p:pic>
-      <p:pic>
-        <p:nvPicPr>
-          <p:cNvPr id="6" name="Picture 5" descr="GitHub-Mark.png"/>
-          <p:cNvPicPr>
-            <a:picLocks noChangeAspect="1"/>
-          </p:cNvPicPr>
-          <p:nvPr/>
-        </p:nvPicPr>
-        <p:blipFill>
-          <a:blip r:embed="rId9">
-            <a:extLst>
-              <a:ext uri="{28A0092B-C50C-407E-A947-70E740481C1C}">
-                <a14:useLocalDpi xmlns:a14="http://schemas.microsoft.com/office/drawing/2010/main" val="0"/>
-              </a:ext>
-            </a:extLst>
-          </a:blip>
-          <a:stretch>
-            <a:fillRect/>
-          </a:stretch>
-        </p:blipFill>
-        <p:spPr>
-          <a:xfrm>
-            <a:off x="7315200" y="2362200"/>
-            <a:ext cx="1447800" cy="1447800"/>
-          </a:xfrm>
-          <a:prstGeom prst="rect">
-            <a:avLst/>
-          </a:prstGeom>
-        </p:spPr>
-      </p:pic>
-      <p:sp>
-        <p:nvSpPr>
-          <p:cNvPr id="7" name="TextBox 6"/>
-          <p:cNvSpPr txBox="1"/>
-          <p:nvPr/>
-        </p:nvSpPr>
-        <p:spPr>
-          <a:xfrm>
-            <a:off x="5029200" y="2057400"/>
-            <a:ext cx="3725374" cy="369332"/>
-          </a:xfrm>
-          <a:prstGeom prst="rect">
-            <a:avLst/>
-          </a:prstGeom>
-          <a:noFill/>
-        </p:spPr>
-        <p:txBody>
-          <a:bodyPr wrap="none" rtlCol="0">
-            <a:spAutoFit/>
-          </a:bodyPr>
-          <a:lstStyle/>
-          <a:p>
-            <a:r>
-              <a:rPr lang="en-US" dirty="0"/>
-              <a:t>https://</a:t>
-            </a:r>
-            <a:r>
-              <a:rPr lang="en-US" dirty="0" err="1"/>
-              <a:t>github.com</a:t>
-            </a:r>
-            <a:r>
-              <a:rPr lang="en-US" dirty="0"/>
-              <a:t>/phase4ground</a:t>
-            </a:r>
-          </a:p>
-        </p:txBody>
-      </p:sp>
-    </p:spTree>
-    <p:extLst>
-      <p:ext uri="{BB962C8B-B14F-4D97-AF65-F5344CB8AC3E}">
-        <p14:creationId xmlns:p14="http://schemas.microsoft.com/office/powerpoint/2010/main" val="2169168539"/>
-      </p:ext>
-    </p:extLst>
-  </p:cSld>
-  <p:clrMapOvr>
-    <a:masterClrMapping/>
-  </p:clrMapOvr>
-  <p:transition xmlns:p14="http://schemas.microsoft.com/office/powerpoint/2010/main" spd="slow">
-    <p:fade/>
-  </p:transition>
-  <p:timing>
-    <p:tnLst>
-      <p:par>
-        <p:cTn xmlns:p14="http://schemas.microsoft.com/office/powerpoint/2010/main" id="1" dur="indefinite" restart="never" nodeType="tmRoot"/>
-      </p:par>
-    </p:tnLst>
-  </p:timing>
 </p:sld>
 </file>
 

</xml_diff>